<commit_message>
Add OpenCL GPU/FPGA diff note
</commit_message>
<xml_diff>
--- a/Projektdokumente/Team 5a.pptx
+++ b/Projektdokumente/Team 5a.pptx
@@ -6247,7 +6247,7 @@
           <p:cNvPr id="2" name="Titel 1">
             <a:extLst>
               <a:ext uri="{FF2B5EF4-FFF2-40B4-BE49-F238E27FC236}">
-                <a16:creationId xmlns:a16="http://schemas.microsoft.com/office/drawing/2014/main" xmlns="" id="{50D9F900-C13B-4A28-B9A3-056BC0F43CD1}"/>
+                <a16:creationId xmlns="" xmlns:a16="http://schemas.microsoft.com/office/drawing/2014/main" id="{50D9F900-C13B-4A28-B9A3-056BC0F43CD1}"/>
               </a:ext>
             </a:extLst>
           </p:cNvPr>
@@ -6280,7 +6280,7 @@
           <p:cNvPr id="3" name="Untertitel 2">
             <a:extLst>
               <a:ext uri="{FF2B5EF4-FFF2-40B4-BE49-F238E27FC236}">
-                <a16:creationId xmlns:a16="http://schemas.microsoft.com/office/drawing/2014/main" xmlns="" id="{AB905DCD-48A2-4943-81CB-111D904F9E4A}"/>
+                <a16:creationId xmlns="" xmlns:a16="http://schemas.microsoft.com/office/drawing/2014/main" id="{AB905DCD-48A2-4943-81CB-111D904F9E4A}"/>
               </a:ext>
             </a:extLst>
           </p:cNvPr>
@@ -6335,7 +6335,7 @@
           <p:cNvPr id="5" name="Grafik 4">
             <a:extLst>
               <a:ext uri="{FF2B5EF4-FFF2-40B4-BE49-F238E27FC236}">
-                <a16:creationId xmlns:a16="http://schemas.microsoft.com/office/drawing/2014/main" xmlns="" id="{D2753509-77C2-485A-B3EC-7404AC768E3B}"/>
+                <a16:creationId xmlns="" xmlns:a16="http://schemas.microsoft.com/office/drawing/2014/main" id="{D2753509-77C2-485A-B3EC-7404AC768E3B}"/>
               </a:ext>
             </a:extLst>
           </p:cNvPr>
@@ -6401,7 +6401,7 @@
           <p:cNvPr id="2" name="Titel 1">
             <a:extLst>
               <a:ext uri="{FF2B5EF4-FFF2-40B4-BE49-F238E27FC236}">
-                <a16:creationId xmlns:a16="http://schemas.microsoft.com/office/drawing/2014/main" xmlns="" id="{6B33D700-32EC-4BEF-B6A4-9F8D0B1C7ACD}"/>
+                <a16:creationId xmlns="" xmlns:a16="http://schemas.microsoft.com/office/drawing/2014/main" id="{6B33D700-32EC-4BEF-B6A4-9F8D0B1C7ACD}"/>
               </a:ext>
             </a:extLst>
           </p:cNvPr>
@@ -6431,7 +6431,7 @@
           <p:cNvPr id="3" name="Textplatzhalter 2">
             <a:extLst>
               <a:ext uri="{FF2B5EF4-FFF2-40B4-BE49-F238E27FC236}">
-                <a16:creationId xmlns:a16="http://schemas.microsoft.com/office/drawing/2014/main" xmlns="" id="{6866D80B-647B-41B2-B27B-1294D968D731}"/>
+                <a16:creationId xmlns="" xmlns:a16="http://schemas.microsoft.com/office/drawing/2014/main" id="{6866D80B-647B-41B2-B27B-1294D968D731}"/>
               </a:ext>
             </a:extLst>
           </p:cNvPr>
@@ -6489,7 +6489,7 @@
           <p:cNvPr id="2" name="Titel 1">
             <a:extLst>
               <a:ext uri="{FF2B5EF4-FFF2-40B4-BE49-F238E27FC236}">
-                <a16:creationId xmlns:a16="http://schemas.microsoft.com/office/drawing/2014/main" xmlns="" id="{8787FCCE-9CD5-4A90-8FBC-069678E696E7}"/>
+                <a16:creationId xmlns="" xmlns:a16="http://schemas.microsoft.com/office/drawing/2014/main" id="{8787FCCE-9CD5-4A90-8FBC-069678E696E7}"/>
               </a:ext>
             </a:extLst>
           </p:cNvPr>
@@ -6517,7 +6517,7 @@
           <p:cNvPr id="3" name="Inhaltsplatzhalter 2">
             <a:extLst>
               <a:ext uri="{FF2B5EF4-FFF2-40B4-BE49-F238E27FC236}">
-                <a16:creationId xmlns:a16="http://schemas.microsoft.com/office/drawing/2014/main" xmlns="" id="{7D4D6545-C4AA-41A4-A07A-7AD68269415C}"/>
+                <a16:creationId xmlns="" xmlns:a16="http://schemas.microsoft.com/office/drawing/2014/main" id="{7D4D6545-C4AA-41A4-A07A-7AD68269415C}"/>
               </a:ext>
             </a:extLst>
           </p:cNvPr>
@@ -6582,7 +6582,7 @@
           <p:cNvPr id="4" name="Fußzeilenplatzhalter 3">
             <a:extLst>
               <a:ext uri="{FF2B5EF4-FFF2-40B4-BE49-F238E27FC236}">
-                <a16:creationId xmlns:a16="http://schemas.microsoft.com/office/drawing/2014/main" xmlns="" id="{05A79631-50EB-4869-AD25-DDE67A9B97F6}"/>
+                <a16:creationId xmlns="" xmlns:a16="http://schemas.microsoft.com/office/drawing/2014/main" id="{05A79631-50EB-4869-AD25-DDE67A9B97F6}"/>
               </a:ext>
             </a:extLst>
           </p:cNvPr>
@@ -6640,7 +6640,7 @@
           <p:cNvPr id="2" name="Titel 1">
             <a:extLst>
               <a:ext uri="{FF2B5EF4-FFF2-40B4-BE49-F238E27FC236}">
-                <a16:creationId xmlns:a16="http://schemas.microsoft.com/office/drawing/2014/main" xmlns="" id="{91F54FE9-D8A4-4AC6-A3E0-6C087F525248}"/>
+                <a16:creationId xmlns="" xmlns:a16="http://schemas.microsoft.com/office/drawing/2014/main" id="{91F54FE9-D8A4-4AC6-A3E0-6C087F525248}"/>
               </a:ext>
             </a:extLst>
           </p:cNvPr>
@@ -6668,7 +6668,7 @@
           <p:cNvPr id="3" name="Inhaltsplatzhalter 2">
             <a:extLst>
               <a:ext uri="{FF2B5EF4-FFF2-40B4-BE49-F238E27FC236}">
-                <a16:creationId xmlns:a16="http://schemas.microsoft.com/office/drawing/2014/main" xmlns="" id="{A2809F03-0F60-4847-BCF4-0688F41E2204}"/>
+                <a16:creationId xmlns="" xmlns:a16="http://schemas.microsoft.com/office/drawing/2014/main" id="{A2809F03-0F60-4847-BCF4-0688F41E2204}"/>
               </a:ext>
             </a:extLst>
           </p:cNvPr>
@@ -6713,7 +6713,7 @@
           <p:cNvPr id="4" name="Fußzeilenplatzhalter 3">
             <a:extLst>
               <a:ext uri="{FF2B5EF4-FFF2-40B4-BE49-F238E27FC236}">
-                <a16:creationId xmlns:a16="http://schemas.microsoft.com/office/drawing/2014/main" xmlns="" id="{64FB9F9C-6B5F-4A35-BC28-17BE63DAE8C3}"/>
+                <a16:creationId xmlns="" xmlns:a16="http://schemas.microsoft.com/office/drawing/2014/main" id="{64FB9F9C-6B5F-4A35-BC28-17BE63DAE8C3}"/>
               </a:ext>
             </a:extLst>
           </p:cNvPr>
@@ -6771,7 +6771,7 @@
           <p:cNvPr id="2" name="Titel 1">
             <a:extLst>
               <a:ext uri="{FF2B5EF4-FFF2-40B4-BE49-F238E27FC236}">
-                <a16:creationId xmlns:a16="http://schemas.microsoft.com/office/drawing/2014/main" xmlns="" id="{91F54FE9-D8A4-4AC6-A3E0-6C087F525248}"/>
+                <a16:creationId xmlns="" xmlns:a16="http://schemas.microsoft.com/office/drawing/2014/main" id="{91F54FE9-D8A4-4AC6-A3E0-6C087F525248}"/>
               </a:ext>
             </a:extLst>
           </p:cNvPr>
@@ -6799,7 +6799,7 @@
           <p:cNvPr id="3" name="Inhaltsplatzhalter 2">
             <a:extLst>
               <a:ext uri="{FF2B5EF4-FFF2-40B4-BE49-F238E27FC236}">
-                <a16:creationId xmlns:a16="http://schemas.microsoft.com/office/drawing/2014/main" xmlns="" id="{A2809F03-0F60-4847-BCF4-0688F41E2204}"/>
+                <a16:creationId xmlns="" xmlns:a16="http://schemas.microsoft.com/office/drawing/2014/main" id="{A2809F03-0F60-4847-BCF4-0688F41E2204}"/>
               </a:ext>
             </a:extLst>
           </p:cNvPr>
@@ -6861,7 +6861,7 @@
           <p:cNvPr id="4" name="Fußzeilenplatzhalter 3">
             <a:extLst>
               <a:ext uri="{FF2B5EF4-FFF2-40B4-BE49-F238E27FC236}">
-                <a16:creationId xmlns:a16="http://schemas.microsoft.com/office/drawing/2014/main" xmlns="" id="{7D981296-08B3-4506-87EB-66A214A27123}"/>
+                <a16:creationId xmlns="" xmlns:a16="http://schemas.microsoft.com/office/drawing/2014/main" id="{7D981296-08B3-4506-87EB-66A214A27123}"/>
               </a:ext>
             </a:extLst>
           </p:cNvPr>
@@ -6919,7 +6919,7 @@
           <p:cNvPr id="2" name="Titel 1">
             <a:extLst>
               <a:ext uri="{FF2B5EF4-FFF2-40B4-BE49-F238E27FC236}">
-                <a16:creationId xmlns:a16="http://schemas.microsoft.com/office/drawing/2014/main" xmlns="" id="{0BF7D0A5-5D28-4AB2-B51B-7F02CB0BD852}"/>
+                <a16:creationId xmlns="" xmlns:a16="http://schemas.microsoft.com/office/drawing/2014/main" id="{0BF7D0A5-5D28-4AB2-B51B-7F02CB0BD852}"/>
               </a:ext>
             </a:extLst>
           </p:cNvPr>
@@ -6947,7 +6947,7 @@
           <p:cNvPr id="3" name="Inhaltsplatzhalter 2">
             <a:extLst>
               <a:ext uri="{FF2B5EF4-FFF2-40B4-BE49-F238E27FC236}">
-                <a16:creationId xmlns:a16="http://schemas.microsoft.com/office/drawing/2014/main" xmlns="" id="{464CE860-7206-4C2F-B398-2162152088AD}"/>
+                <a16:creationId xmlns="" xmlns:a16="http://schemas.microsoft.com/office/drawing/2014/main" id="{464CE860-7206-4C2F-B398-2162152088AD}"/>
               </a:ext>
             </a:extLst>
           </p:cNvPr>
@@ -7012,7 +7012,7 @@
           <p:cNvPr id="4" name="Fußzeilenplatzhalter 3">
             <a:extLst>
               <a:ext uri="{FF2B5EF4-FFF2-40B4-BE49-F238E27FC236}">
-                <a16:creationId xmlns:a16="http://schemas.microsoft.com/office/drawing/2014/main" xmlns="" id="{BCF15641-D365-465E-BB4A-4827CC0864F9}"/>
+                <a16:creationId xmlns="" xmlns:a16="http://schemas.microsoft.com/office/drawing/2014/main" id="{BCF15641-D365-465E-BB4A-4827CC0864F9}"/>
               </a:ext>
             </a:extLst>
           </p:cNvPr>
@@ -7070,7 +7070,7 @@
           <p:cNvPr id="2" name="Titel 1">
             <a:extLst>
               <a:ext uri="{FF2B5EF4-FFF2-40B4-BE49-F238E27FC236}">
-                <a16:creationId xmlns:a16="http://schemas.microsoft.com/office/drawing/2014/main" xmlns="" id="{1F4C0B71-DDF0-4CA0-A2B1-66C9D0455069}"/>
+                <a16:creationId xmlns="" xmlns:a16="http://schemas.microsoft.com/office/drawing/2014/main" id="{1F4C0B71-DDF0-4CA0-A2B1-66C9D0455069}"/>
               </a:ext>
             </a:extLst>
           </p:cNvPr>
@@ -7099,7 +7099,7 @@
           <p:cNvPr id="3" name="Inhaltsplatzhalter 2">
             <a:extLst>
               <a:ext uri="{FF2B5EF4-FFF2-40B4-BE49-F238E27FC236}">
-                <a16:creationId xmlns:a16="http://schemas.microsoft.com/office/drawing/2014/main" xmlns="" id="{FC97EE4E-D42B-46E9-9E93-A6D4E2E15913}"/>
+                <a16:creationId xmlns="" xmlns:a16="http://schemas.microsoft.com/office/drawing/2014/main" id="{FC97EE4E-D42B-46E9-9E93-A6D4E2E15913}"/>
               </a:ext>
             </a:extLst>
           </p:cNvPr>
@@ -7125,7 +7125,6 @@
               <a:rPr lang="de-DE" dirty="0" smtClean="0"/>
               <a:t>Beide sind auf der Grafikkarte lauffähig</a:t>
             </a:r>
-            <a:endParaRPr lang="de-DE" dirty="0" smtClean="0"/>
           </a:p>
           <a:p>
             <a:r>
@@ -7192,8 +7191,19 @@
             </a:r>
             <a:r>
               <a:rPr lang="de-DE" dirty="0" smtClean="0"/>
-              <a:t> Speicherzugriff?</a:t>
-            </a:r>
+              <a:t> Speicherzugriff</a:t>
+            </a:r>
+            <a:r>
+              <a:rPr lang="de-DE" dirty="0" smtClean="0"/>
+              <a:t>?</a:t>
+            </a:r>
+          </a:p>
+          <a:p>
+            <a:r>
+              <a:rPr lang="de-DE" dirty="0" smtClean="0"/>
+              <a:t>Selber Code, unterschiedliche Ergebnisse auf Grafikkarte bzw. FPGA</a:t>
+            </a:r>
+            <a:endParaRPr lang="de-DE" dirty="0" smtClean="0"/>
           </a:p>
         </p:txBody>
       </p:sp>
@@ -7202,7 +7212,7 @@
           <p:cNvPr id="4" name="Fußzeilenplatzhalter 3">
             <a:extLst>
               <a:ext uri="{FF2B5EF4-FFF2-40B4-BE49-F238E27FC236}">
-                <a16:creationId xmlns:a16="http://schemas.microsoft.com/office/drawing/2014/main" xmlns="" id="{F9986648-D8E9-42C3-848F-0F780D53C173}"/>
+                <a16:creationId xmlns="" xmlns:a16="http://schemas.microsoft.com/office/drawing/2014/main" id="{F9986648-D8E9-42C3-848F-0F780D53C173}"/>
               </a:ext>
             </a:extLst>
           </p:cNvPr>
@@ -7260,7 +7270,7 @@
           <p:cNvPr id="2" name="Titel 1">
             <a:extLst>
               <a:ext uri="{FF2B5EF4-FFF2-40B4-BE49-F238E27FC236}">
-                <a16:creationId xmlns:a16="http://schemas.microsoft.com/office/drawing/2014/main" xmlns="" id="{8B6B458A-A4CA-433F-AAAD-8FC04CABFF33}"/>
+                <a16:creationId xmlns="" xmlns:a16="http://schemas.microsoft.com/office/drawing/2014/main" id="{8B6B458A-A4CA-433F-AAAD-8FC04CABFF33}"/>
               </a:ext>
             </a:extLst>
           </p:cNvPr>
@@ -7288,7 +7298,7 @@
           <p:cNvPr id="3" name="Inhaltsplatzhalter 2">
             <a:extLst>
               <a:ext uri="{FF2B5EF4-FFF2-40B4-BE49-F238E27FC236}">
-                <a16:creationId xmlns:a16="http://schemas.microsoft.com/office/drawing/2014/main" xmlns="" id="{054FEABA-6080-4B42-A48F-7A4DF3A2C20A}"/>
+                <a16:creationId xmlns="" xmlns:a16="http://schemas.microsoft.com/office/drawing/2014/main" id="{054FEABA-6080-4B42-A48F-7A4DF3A2C20A}"/>
               </a:ext>
             </a:extLst>
           </p:cNvPr>
@@ -7314,7 +7324,6 @@
               <a:rPr lang="de-DE" dirty="0" smtClean="0"/>
               <a:t>Eigene Lösung entworfen</a:t>
             </a:r>
-            <a:endParaRPr lang="de-DE" dirty="0" smtClean="0"/>
           </a:p>
           <a:p>
             <a:r>
@@ -7364,7 +7373,7 @@
           <p:cNvPr id="4" name="Fußzeilenplatzhalter 3">
             <a:extLst>
               <a:ext uri="{FF2B5EF4-FFF2-40B4-BE49-F238E27FC236}">
-                <a16:creationId xmlns:a16="http://schemas.microsoft.com/office/drawing/2014/main" xmlns="" id="{3EE84E52-5BE9-4D99-8DB9-751624176F6F}"/>
+                <a16:creationId xmlns="" xmlns:a16="http://schemas.microsoft.com/office/drawing/2014/main" id="{3EE84E52-5BE9-4D99-8DB9-751624176F6F}"/>
               </a:ext>
             </a:extLst>
           </p:cNvPr>
@@ -7422,7 +7431,7 @@
           <p:cNvPr id="2" name="Titel 1">
             <a:extLst>
               <a:ext uri="{FF2B5EF4-FFF2-40B4-BE49-F238E27FC236}">
-                <a16:creationId xmlns:a16="http://schemas.microsoft.com/office/drawing/2014/main" xmlns="" id="{0580E4C2-EB66-46DC-BA2A-B665A84F0EF3}"/>
+                <a16:creationId xmlns="" xmlns:a16="http://schemas.microsoft.com/office/drawing/2014/main" id="{0580E4C2-EB66-46DC-BA2A-B665A84F0EF3}"/>
               </a:ext>
             </a:extLst>
           </p:cNvPr>
@@ -7450,7 +7459,7 @@
           <p:cNvPr id="3" name="Inhaltsplatzhalter 2">
             <a:extLst>
               <a:ext uri="{FF2B5EF4-FFF2-40B4-BE49-F238E27FC236}">
-                <a16:creationId xmlns:a16="http://schemas.microsoft.com/office/drawing/2014/main" xmlns="" id="{E303F5D1-DC3B-469E-9EAF-2342748534C8}"/>
+                <a16:creationId xmlns="" xmlns:a16="http://schemas.microsoft.com/office/drawing/2014/main" id="{E303F5D1-DC3B-469E-9EAF-2342748534C8}"/>
               </a:ext>
             </a:extLst>
           </p:cNvPr>
@@ -7538,7 +7547,7 @@
           <p:cNvPr id="4" name="Fußzeilenplatzhalter 3">
             <a:extLst>
               <a:ext uri="{FF2B5EF4-FFF2-40B4-BE49-F238E27FC236}">
-                <a16:creationId xmlns:a16="http://schemas.microsoft.com/office/drawing/2014/main" xmlns="" id="{66F2FD68-A385-4A5A-82BB-108B4682803C}"/>
+                <a16:creationId xmlns="" xmlns:a16="http://schemas.microsoft.com/office/drawing/2014/main" id="{66F2FD68-A385-4A5A-82BB-108B4682803C}"/>
               </a:ext>
             </a:extLst>
           </p:cNvPr>
@@ -7596,7 +7605,7 @@
           <p:cNvPr id="2" name="Titel 1">
             <a:extLst>
               <a:ext uri="{FF2B5EF4-FFF2-40B4-BE49-F238E27FC236}">
-                <a16:creationId xmlns:a16="http://schemas.microsoft.com/office/drawing/2014/main" xmlns="" id="{0529C191-2FA4-420C-8CDE-625C270054F9}"/>
+                <a16:creationId xmlns="" xmlns:a16="http://schemas.microsoft.com/office/drawing/2014/main" id="{0529C191-2FA4-420C-8CDE-625C270054F9}"/>
               </a:ext>
             </a:extLst>
           </p:cNvPr>
@@ -7624,7 +7633,7 @@
           <p:cNvPr id="3" name="Textplatzhalter 2">
             <a:extLst>
               <a:ext uri="{FF2B5EF4-FFF2-40B4-BE49-F238E27FC236}">
-                <a16:creationId xmlns:a16="http://schemas.microsoft.com/office/drawing/2014/main" xmlns="" id="{74D8B0BB-964D-4766-8243-C38AE0AFC304}"/>
+                <a16:creationId xmlns="" xmlns:a16="http://schemas.microsoft.com/office/drawing/2014/main" id="{74D8B0BB-964D-4766-8243-C38AE0AFC304}"/>
               </a:ext>
             </a:extLst>
           </p:cNvPr>
@@ -7649,7 +7658,7 @@
           <p:cNvPr id="4" name="Fußzeilenplatzhalter 3">
             <a:extLst>
               <a:ext uri="{FF2B5EF4-FFF2-40B4-BE49-F238E27FC236}">
-                <a16:creationId xmlns:a16="http://schemas.microsoft.com/office/drawing/2014/main" xmlns="" id="{AE7C686D-C715-46E7-B50C-5436AF564484}"/>
+                <a16:creationId xmlns="" xmlns:a16="http://schemas.microsoft.com/office/drawing/2014/main" id="{AE7C686D-C715-46E7-B50C-5436AF564484}"/>
               </a:ext>
             </a:extLst>
           </p:cNvPr>

</xml_diff>

<commit_message>
Prüfprotokoll, Präsi fix, Projekt doku
</commit_message>
<xml_diff>
--- a/Projektdokumente/Team 5a.pptx
+++ b/Projektdokumente/Team 5a.pptx
@@ -206,7 +206,7 @@
           <a:p>
             <a:fld id="{35E4980F-7A2F-4229-9EEF-403BC7327AE5}" type="datetimeFigureOut">
               <a:rPr lang="de-DE" smtClean="0"/>
-              <a:t>20.09.17</a:t>
+              <a:t>21.09.17</a:t>
             </a:fld>
             <a:endParaRPr lang="de-DE"/>
           </a:p>
@@ -1195,7 +1195,7 @@
           <a:p>
             <a:fld id="{5EE74383-BFB2-4D88-95FA-818D572F9DCA}" type="datetime1">
               <a:rPr lang="de-DE" smtClean="0"/>
-              <a:t>20.09.17</a:t>
+              <a:t>21.09.17</a:t>
             </a:fld>
             <a:endParaRPr lang="de-DE"/>
           </a:p>
@@ -1449,7 +1449,7 @@
           <a:p>
             <a:fld id="{6A488746-A9E0-4C64-8578-78AC9AE8AC05}" type="datetime1">
               <a:rPr lang="de-DE" smtClean="0"/>
-              <a:t>20.09.17</a:t>
+              <a:t>21.09.17</a:t>
             </a:fld>
             <a:endParaRPr lang="de-DE"/>
           </a:p>
@@ -1766,7 +1766,7 @@
           <a:p>
             <a:fld id="{030B4F9B-6562-4743-BDB0-A7782BA56A0A}" type="datetime1">
               <a:rPr lang="de-DE" smtClean="0"/>
-              <a:t>20.09.17</a:t>
+              <a:t>21.09.17</a:t>
             </a:fld>
             <a:endParaRPr lang="de-DE"/>
           </a:p>
@@ -2110,7 +2110,7 @@
           <a:p>
             <a:fld id="{49FA5B3F-C17D-4DD5-ADB3-692A6FDA3CA7}" type="datetime1">
               <a:rPr lang="de-DE" smtClean="0"/>
-              <a:t>20.09.17</a:t>
+              <a:t>21.09.17</a:t>
             </a:fld>
             <a:endParaRPr lang="de-DE"/>
           </a:p>
@@ -2427,7 +2427,7 @@
           <a:p>
             <a:fld id="{1B6199AC-EAED-4E3A-AB3A-9246F655FD54}" type="datetime1">
               <a:rPr lang="de-DE" smtClean="0"/>
-              <a:t>20.09.17</a:t>
+              <a:t>21.09.17</a:t>
             </a:fld>
             <a:endParaRPr lang="de-DE"/>
           </a:p>
@@ -2823,7 +2823,7 @@
           <a:p>
             <a:fld id="{40560B96-ADD5-4FB9-8560-2495F52946D0}" type="datetime1">
               <a:rPr lang="de-DE" smtClean="0"/>
-              <a:t>20.09.17</a:t>
+              <a:t>21.09.17</a:t>
             </a:fld>
             <a:endParaRPr lang="de-DE"/>
           </a:p>
@@ -2996,7 +2996,7 @@
           <a:p>
             <a:fld id="{59FAFE30-6FB4-490C-A09A-DEA60CC19F05}" type="datetime1">
               <a:rPr lang="de-DE" smtClean="0"/>
-              <a:t>20.09.17</a:t>
+              <a:t>21.09.17</a:t>
             </a:fld>
             <a:endParaRPr lang="de-DE"/>
           </a:p>
@@ -3179,7 +3179,7 @@
           <a:p>
             <a:fld id="{CAFBB611-0F57-40D3-853B-A106752AE97D}" type="datetime1">
               <a:rPr lang="de-DE" smtClean="0"/>
-              <a:t>20.09.17</a:t>
+              <a:t>21.09.17</a:t>
             </a:fld>
             <a:endParaRPr lang="de-DE"/>
           </a:p>
@@ -3358,7 +3358,7 @@
           <a:p>
             <a:fld id="{1F49B2C8-A340-4693-9CB6-4FEFCE8CC575}" type="datetime1">
               <a:rPr lang="de-DE" smtClean="0"/>
-              <a:t>20.09.17</a:t>
+              <a:t>21.09.17</a:t>
             </a:fld>
             <a:endParaRPr lang="de-DE"/>
           </a:p>
@@ -3608,7 +3608,7 @@
           <a:p>
             <a:fld id="{A0E7D7AD-8482-4A9E-A9EF-D83CE5EF2BB4}" type="datetime1">
               <a:rPr lang="de-DE" smtClean="0"/>
-              <a:t>20.09.17</a:t>
+              <a:t>21.09.17</a:t>
             </a:fld>
             <a:endParaRPr lang="de-DE"/>
           </a:p>
@@ -3843,7 +3843,7 @@
           <a:p>
             <a:fld id="{C792654D-96F2-4CB2-A784-1D655A51676D}" type="datetime1">
               <a:rPr lang="de-DE" smtClean="0"/>
-              <a:t>20.09.17</a:t>
+              <a:t>21.09.17</a:t>
             </a:fld>
             <a:endParaRPr lang="de-DE"/>
           </a:p>
@@ -4220,7 +4220,7 @@
           <a:p>
             <a:fld id="{5197B878-0DDE-4AD6-8DE0-7A18B2F95EFF}" type="datetime1">
               <a:rPr lang="de-DE" smtClean="0"/>
-              <a:t>20.09.17</a:t>
+              <a:t>21.09.17</a:t>
             </a:fld>
             <a:endParaRPr lang="de-DE"/>
           </a:p>
@@ -4346,7 +4346,7 @@
           <a:p>
             <a:fld id="{29ABC916-24E7-4918-8C30-21E6FDD67243}" type="datetime1">
               <a:rPr lang="de-DE" smtClean="0"/>
-              <a:t>20.09.17</a:t>
+              <a:t>21.09.17</a:t>
             </a:fld>
             <a:endParaRPr lang="de-DE"/>
           </a:p>
@@ -4444,7 +4444,7 @@
           <a:p>
             <a:fld id="{DEE2B438-E97A-4940-8C4F-FDA2A5551469}" type="datetime1">
               <a:rPr lang="de-DE" smtClean="0"/>
-              <a:t>20.09.17</a:t>
+              <a:t>21.09.17</a:t>
             </a:fld>
             <a:endParaRPr lang="de-DE"/>
           </a:p>
@@ -4702,7 +4702,7 @@
           <a:p>
             <a:fld id="{AE6FAC99-BE8A-44A0-BFC6-582CA3A2B8E6}" type="datetime1">
               <a:rPr lang="de-DE" smtClean="0"/>
-              <a:t>20.09.17</a:t>
+              <a:t>21.09.17</a:t>
             </a:fld>
             <a:endParaRPr lang="de-DE"/>
           </a:p>
@@ -4968,7 +4968,7 @@
           <a:p>
             <a:fld id="{5146008D-E671-44B8-B485-1B18990DE070}" type="datetime1">
               <a:rPr lang="de-DE" smtClean="0"/>
-              <a:t>20.09.17</a:t>
+              <a:t>21.09.17</a:t>
             </a:fld>
             <a:endParaRPr lang="de-DE"/>
           </a:p>
@@ -5714,7 +5714,7 @@
           <a:p>
             <a:fld id="{779B8B36-40B9-42E1-BCDC-83164CCEB6EF}" type="datetime1">
               <a:rPr lang="de-DE" smtClean="0"/>
-              <a:t>20.09.17</a:t>
+              <a:t>21.09.17</a:t>
             </a:fld>
             <a:endParaRPr lang="de-DE"/>
           </a:p>
@@ -6247,7 +6247,7 @@
           <p:cNvPr id="2" name="Titel 1">
             <a:extLst>
               <a:ext uri="{FF2B5EF4-FFF2-40B4-BE49-F238E27FC236}">
-                <a16:creationId xmlns="" xmlns:a16="http://schemas.microsoft.com/office/drawing/2014/main" id="{50D9F900-C13B-4A28-B9A3-056BC0F43CD1}"/>
+                <a16:creationId xmlns:a16="http://schemas.microsoft.com/office/drawing/2014/main" xmlns="" id="{50D9F900-C13B-4A28-B9A3-056BC0F43CD1}"/>
               </a:ext>
             </a:extLst>
           </p:cNvPr>
@@ -6280,7 +6280,7 @@
           <p:cNvPr id="3" name="Untertitel 2">
             <a:extLst>
               <a:ext uri="{FF2B5EF4-FFF2-40B4-BE49-F238E27FC236}">
-                <a16:creationId xmlns="" xmlns:a16="http://schemas.microsoft.com/office/drawing/2014/main" id="{AB905DCD-48A2-4943-81CB-111D904F9E4A}"/>
+                <a16:creationId xmlns:a16="http://schemas.microsoft.com/office/drawing/2014/main" xmlns="" id="{AB905DCD-48A2-4943-81CB-111D904F9E4A}"/>
               </a:ext>
             </a:extLst>
           </p:cNvPr>
@@ -6335,7 +6335,7 @@
           <p:cNvPr id="5" name="Grafik 4">
             <a:extLst>
               <a:ext uri="{FF2B5EF4-FFF2-40B4-BE49-F238E27FC236}">
-                <a16:creationId xmlns="" xmlns:a16="http://schemas.microsoft.com/office/drawing/2014/main" id="{D2753509-77C2-485A-B3EC-7404AC768E3B}"/>
+                <a16:creationId xmlns:a16="http://schemas.microsoft.com/office/drawing/2014/main" xmlns="" id="{D2753509-77C2-485A-B3EC-7404AC768E3B}"/>
               </a:ext>
             </a:extLst>
           </p:cNvPr>
@@ -6401,7 +6401,7 @@
           <p:cNvPr id="2" name="Titel 1">
             <a:extLst>
               <a:ext uri="{FF2B5EF4-FFF2-40B4-BE49-F238E27FC236}">
-                <a16:creationId xmlns="" xmlns:a16="http://schemas.microsoft.com/office/drawing/2014/main" id="{6B33D700-32EC-4BEF-B6A4-9F8D0B1C7ACD}"/>
+                <a16:creationId xmlns:a16="http://schemas.microsoft.com/office/drawing/2014/main" xmlns="" id="{6B33D700-32EC-4BEF-B6A4-9F8D0B1C7ACD}"/>
               </a:ext>
             </a:extLst>
           </p:cNvPr>
@@ -6431,7 +6431,7 @@
           <p:cNvPr id="3" name="Textplatzhalter 2">
             <a:extLst>
               <a:ext uri="{FF2B5EF4-FFF2-40B4-BE49-F238E27FC236}">
-                <a16:creationId xmlns="" xmlns:a16="http://schemas.microsoft.com/office/drawing/2014/main" id="{6866D80B-647B-41B2-B27B-1294D968D731}"/>
+                <a16:creationId xmlns:a16="http://schemas.microsoft.com/office/drawing/2014/main" xmlns="" id="{6866D80B-647B-41B2-B27B-1294D968D731}"/>
               </a:ext>
             </a:extLst>
           </p:cNvPr>
@@ -6489,7 +6489,7 @@
           <p:cNvPr id="2" name="Titel 1">
             <a:extLst>
               <a:ext uri="{FF2B5EF4-FFF2-40B4-BE49-F238E27FC236}">
-                <a16:creationId xmlns="" xmlns:a16="http://schemas.microsoft.com/office/drawing/2014/main" id="{8787FCCE-9CD5-4A90-8FBC-069678E696E7}"/>
+                <a16:creationId xmlns:a16="http://schemas.microsoft.com/office/drawing/2014/main" xmlns="" id="{8787FCCE-9CD5-4A90-8FBC-069678E696E7}"/>
               </a:ext>
             </a:extLst>
           </p:cNvPr>
@@ -6517,7 +6517,7 @@
           <p:cNvPr id="3" name="Inhaltsplatzhalter 2">
             <a:extLst>
               <a:ext uri="{FF2B5EF4-FFF2-40B4-BE49-F238E27FC236}">
-                <a16:creationId xmlns="" xmlns:a16="http://schemas.microsoft.com/office/drawing/2014/main" id="{7D4D6545-C4AA-41A4-A07A-7AD68269415C}"/>
+                <a16:creationId xmlns:a16="http://schemas.microsoft.com/office/drawing/2014/main" xmlns="" id="{7D4D6545-C4AA-41A4-A07A-7AD68269415C}"/>
               </a:ext>
             </a:extLst>
           </p:cNvPr>
@@ -6582,7 +6582,7 @@
           <p:cNvPr id="4" name="Fußzeilenplatzhalter 3">
             <a:extLst>
               <a:ext uri="{FF2B5EF4-FFF2-40B4-BE49-F238E27FC236}">
-                <a16:creationId xmlns="" xmlns:a16="http://schemas.microsoft.com/office/drawing/2014/main" id="{05A79631-50EB-4869-AD25-DDE67A9B97F6}"/>
+                <a16:creationId xmlns:a16="http://schemas.microsoft.com/office/drawing/2014/main" xmlns="" id="{05A79631-50EB-4869-AD25-DDE67A9B97F6}"/>
               </a:ext>
             </a:extLst>
           </p:cNvPr>
@@ -6640,7 +6640,7 @@
           <p:cNvPr id="2" name="Titel 1">
             <a:extLst>
               <a:ext uri="{FF2B5EF4-FFF2-40B4-BE49-F238E27FC236}">
-                <a16:creationId xmlns="" xmlns:a16="http://schemas.microsoft.com/office/drawing/2014/main" id="{91F54FE9-D8A4-4AC6-A3E0-6C087F525248}"/>
+                <a16:creationId xmlns:a16="http://schemas.microsoft.com/office/drawing/2014/main" xmlns="" id="{91F54FE9-D8A4-4AC6-A3E0-6C087F525248}"/>
               </a:ext>
             </a:extLst>
           </p:cNvPr>
@@ -6668,7 +6668,7 @@
           <p:cNvPr id="3" name="Inhaltsplatzhalter 2">
             <a:extLst>
               <a:ext uri="{FF2B5EF4-FFF2-40B4-BE49-F238E27FC236}">
-                <a16:creationId xmlns="" xmlns:a16="http://schemas.microsoft.com/office/drawing/2014/main" id="{A2809F03-0F60-4847-BCF4-0688F41E2204}"/>
+                <a16:creationId xmlns:a16="http://schemas.microsoft.com/office/drawing/2014/main" xmlns="" id="{A2809F03-0F60-4847-BCF4-0688F41E2204}"/>
               </a:ext>
             </a:extLst>
           </p:cNvPr>
@@ -6713,7 +6713,7 @@
           <p:cNvPr id="4" name="Fußzeilenplatzhalter 3">
             <a:extLst>
               <a:ext uri="{FF2B5EF4-FFF2-40B4-BE49-F238E27FC236}">
-                <a16:creationId xmlns="" xmlns:a16="http://schemas.microsoft.com/office/drawing/2014/main" id="{64FB9F9C-6B5F-4A35-BC28-17BE63DAE8C3}"/>
+                <a16:creationId xmlns:a16="http://schemas.microsoft.com/office/drawing/2014/main" xmlns="" id="{64FB9F9C-6B5F-4A35-BC28-17BE63DAE8C3}"/>
               </a:ext>
             </a:extLst>
           </p:cNvPr>
@@ -6771,7 +6771,7 @@
           <p:cNvPr id="2" name="Titel 1">
             <a:extLst>
               <a:ext uri="{FF2B5EF4-FFF2-40B4-BE49-F238E27FC236}">
-                <a16:creationId xmlns="" xmlns:a16="http://schemas.microsoft.com/office/drawing/2014/main" id="{91F54FE9-D8A4-4AC6-A3E0-6C087F525248}"/>
+                <a16:creationId xmlns:a16="http://schemas.microsoft.com/office/drawing/2014/main" xmlns="" id="{91F54FE9-D8A4-4AC6-A3E0-6C087F525248}"/>
               </a:ext>
             </a:extLst>
           </p:cNvPr>
@@ -6799,7 +6799,7 @@
           <p:cNvPr id="3" name="Inhaltsplatzhalter 2">
             <a:extLst>
               <a:ext uri="{FF2B5EF4-FFF2-40B4-BE49-F238E27FC236}">
-                <a16:creationId xmlns="" xmlns:a16="http://schemas.microsoft.com/office/drawing/2014/main" id="{A2809F03-0F60-4847-BCF4-0688F41E2204}"/>
+                <a16:creationId xmlns:a16="http://schemas.microsoft.com/office/drawing/2014/main" xmlns="" id="{A2809F03-0F60-4847-BCF4-0688F41E2204}"/>
               </a:ext>
             </a:extLst>
           </p:cNvPr>
@@ -6861,7 +6861,7 @@
           <p:cNvPr id="4" name="Fußzeilenplatzhalter 3">
             <a:extLst>
               <a:ext uri="{FF2B5EF4-FFF2-40B4-BE49-F238E27FC236}">
-                <a16:creationId xmlns="" xmlns:a16="http://schemas.microsoft.com/office/drawing/2014/main" id="{7D981296-08B3-4506-87EB-66A214A27123}"/>
+                <a16:creationId xmlns:a16="http://schemas.microsoft.com/office/drawing/2014/main" xmlns="" id="{7D981296-08B3-4506-87EB-66A214A27123}"/>
               </a:ext>
             </a:extLst>
           </p:cNvPr>
@@ -6919,7 +6919,7 @@
           <p:cNvPr id="2" name="Titel 1">
             <a:extLst>
               <a:ext uri="{FF2B5EF4-FFF2-40B4-BE49-F238E27FC236}">
-                <a16:creationId xmlns="" xmlns:a16="http://schemas.microsoft.com/office/drawing/2014/main" id="{0BF7D0A5-5D28-4AB2-B51B-7F02CB0BD852}"/>
+                <a16:creationId xmlns:a16="http://schemas.microsoft.com/office/drawing/2014/main" xmlns="" id="{0BF7D0A5-5D28-4AB2-B51B-7F02CB0BD852}"/>
               </a:ext>
             </a:extLst>
           </p:cNvPr>
@@ -6947,7 +6947,7 @@
           <p:cNvPr id="3" name="Inhaltsplatzhalter 2">
             <a:extLst>
               <a:ext uri="{FF2B5EF4-FFF2-40B4-BE49-F238E27FC236}">
-                <a16:creationId xmlns="" xmlns:a16="http://schemas.microsoft.com/office/drawing/2014/main" id="{464CE860-7206-4C2F-B398-2162152088AD}"/>
+                <a16:creationId xmlns:a16="http://schemas.microsoft.com/office/drawing/2014/main" xmlns="" id="{464CE860-7206-4C2F-B398-2162152088AD}"/>
               </a:ext>
             </a:extLst>
           </p:cNvPr>
@@ -7012,7 +7012,7 @@
           <p:cNvPr id="4" name="Fußzeilenplatzhalter 3">
             <a:extLst>
               <a:ext uri="{FF2B5EF4-FFF2-40B4-BE49-F238E27FC236}">
-                <a16:creationId xmlns="" xmlns:a16="http://schemas.microsoft.com/office/drawing/2014/main" id="{BCF15641-D365-465E-BB4A-4827CC0864F9}"/>
+                <a16:creationId xmlns:a16="http://schemas.microsoft.com/office/drawing/2014/main" xmlns="" id="{BCF15641-D365-465E-BB4A-4827CC0864F9}"/>
               </a:ext>
             </a:extLst>
           </p:cNvPr>
@@ -7070,7 +7070,7 @@
           <p:cNvPr id="2" name="Titel 1">
             <a:extLst>
               <a:ext uri="{FF2B5EF4-FFF2-40B4-BE49-F238E27FC236}">
-                <a16:creationId xmlns="" xmlns:a16="http://schemas.microsoft.com/office/drawing/2014/main" id="{1F4C0B71-DDF0-4CA0-A2B1-66C9D0455069}"/>
+                <a16:creationId xmlns:a16="http://schemas.microsoft.com/office/drawing/2014/main" xmlns="" id="{1F4C0B71-DDF0-4CA0-A2B1-66C9D0455069}"/>
               </a:ext>
             </a:extLst>
           </p:cNvPr>
@@ -7099,7 +7099,7 @@
           <p:cNvPr id="3" name="Inhaltsplatzhalter 2">
             <a:extLst>
               <a:ext uri="{FF2B5EF4-FFF2-40B4-BE49-F238E27FC236}">
-                <a16:creationId xmlns="" xmlns:a16="http://schemas.microsoft.com/office/drawing/2014/main" id="{FC97EE4E-D42B-46E9-9E93-A6D4E2E15913}"/>
+                <a16:creationId xmlns:a16="http://schemas.microsoft.com/office/drawing/2014/main" xmlns="" id="{FC97EE4E-D42B-46E9-9E93-A6D4E2E15913}"/>
               </a:ext>
             </a:extLst>
           </p:cNvPr>
@@ -7191,11 +7191,7 @@
             </a:r>
             <a:r>
               <a:rPr lang="de-DE" dirty="0" smtClean="0"/>
-              <a:t> Speicherzugriff</a:t>
-            </a:r>
-            <a:r>
-              <a:rPr lang="de-DE" dirty="0" smtClean="0"/>
-              <a:t>?</a:t>
+              <a:t> Speicherzugriff?</a:t>
             </a:r>
           </a:p>
           <a:p>
@@ -7203,7 +7199,6 @@
               <a:rPr lang="de-DE" dirty="0" smtClean="0"/>
               <a:t>Selber Code, unterschiedliche Ergebnisse auf Grafikkarte bzw. FPGA</a:t>
             </a:r>
-            <a:endParaRPr lang="de-DE" dirty="0" smtClean="0"/>
           </a:p>
         </p:txBody>
       </p:sp>
@@ -7212,7 +7207,7 @@
           <p:cNvPr id="4" name="Fußzeilenplatzhalter 3">
             <a:extLst>
               <a:ext uri="{FF2B5EF4-FFF2-40B4-BE49-F238E27FC236}">
-                <a16:creationId xmlns="" xmlns:a16="http://schemas.microsoft.com/office/drawing/2014/main" id="{F9986648-D8E9-42C3-848F-0F780D53C173}"/>
+                <a16:creationId xmlns:a16="http://schemas.microsoft.com/office/drawing/2014/main" xmlns="" id="{F9986648-D8E9-42C3-848F-0F780D53C173}"/>
               </a:ext>
             </a:extLst>
           </p:cNvPr>
@@ -7270,7 +7265,7 @@
           <p:cNvPr id="2" name="Titel 1">
             <a:extLst>
               <a:ext uri="{FF2B5EF4-FFF2-40B4-BE49-F238E27FC236}">
-                <a16:creationId xmlns="" xmlns:a16="http://schemas.microsoft.com/office/drawing/2014/main" id="{8B6B458A-A4CA-433F-AAAD-8FC04CABFF33}"/>
+                <a16:creationId xmlns:a16="http://schemas.microsoft.com/office/drawing/2014/main" xmlns="" id="{8B6B458A-A4CA-433F-AAAD-8FC04CABFF33}"/>
               </a:ext>
             </a:extLst>
           </p:cNvPr>
@@ -7298,7 +7293,7 @@
           <p:cNvPr id="3" name="Inhaltsplatzhalter 2">
             <a:extLst>
               <a:ext uri="{FF2B5EF4-FFF2-40B4-BE49-F238E27FC236}">
-                <a16:creationId xmlns="" xmlns:a16="http://schemas.microsoft.com/office/drawing/2014/main" id="{054FEABA-6080-4B42-A48F-7A4DF3A2C20A}"/>
+                <a16:creationId xmlns:a16="http://schemas.microsoft.com/office/drawing/2014/main" xmlns="" id="{054FEABA-6080-4B42-A48F-7A4DF3A2C20A}"/>
               </a:ext>
             </a:extLst>
           </p:cNvPr>
@@ -7373,7 +7368,7 @@
           <p:cNvPr id="4" name="Fußzeilenplatzhalter 3">
             <a:extLst>
               <a:ext uri="{FF2B5EF4-FFF2-40B4-BE49-F238E27FC236}">
-                <a16:creationId xmlns="" xmlns:a16="http://schemas.microsoft.com/office/drawing/2014/main" id="{3EE84E52-5BE9-4D99-8DB9-751624176F6F}"/>
+                <a16:creationId xmlns:a16="http://schemas.microsoft.com/office/drawing/2014/main" xmlns="" id="{3EE84E52-5BE9-4D99-8DB9-751624176F6F}"/>
               </a:ext>
             </a:extLst>
           </p:cNvPr>
@@ -7431,7 +7426,7 @@
           <p:cNvPr id="2" name="Titel 1">
             <a:extLst>
               <a:ext uri="{FF2B5EF4-FFF2-40B4-BE49-F238E27FC236}">
-                <a16:creationId xmlns="" xmlns:a16="http://schemas.microsoft.com/office/drawing/2014/main" id="{0580E4C2-EB66-46DC-BA2A-B665A84F0EF3}"/>
+                <a16:creationId xmlns:a16="http://schemas.microsoft.com/office/drawing/2014/main" xmlns="" id="{0580E4C2-EB66-46DC-BA2A-B665A84F0EF3}"/>
               </a:ext>
             </a:extLst>
           </p:cNvPr>
@@ -7459,7 +7454,7 @@
           <p:cNvPr id="3" name="Inhaltsplatzhalter 2">
             <a:extLst>
               <a:ext uri="{FF2B5EF4-FFF2-40B4-BE49-F238E27FC236}">
-                <a16:creationId xmlns="" xmlns:a16="http://schemas.microsoft.com/office/drawing/2014/main" id="{E303F5D1-DC3B-469E-9EAF-2342748534C8}"/>
+                <a16:creationId xmlns:a16="http://schemas.microsoft.com/office/drawing/2014/main" xmlns="" id="{E303F5D1-DC3B-469E-9EAF-2342748534C8}"/>
               </a:ext>
             </a:extLst>
           </p:cNvPr>
@@ -7513,8 +7508,40 @@
             </a:r>
             <a:r>
               <a:rPr lang="de-DE" dirty="0" smtClean="0"/>
-              <a:t> Lösung ist auf DE1-SoC sehr langsam</a:t>
-            </a:r>
+              <a:t> Lösung ist auf DE1-SoC sehr </a:t>
+            </a:r>
+            <a:r>
+              <a:rPr lang="de-DE" dirty="0" smtClean="0"/>
+              <a:t>langsam</a:t>
+            </a:r>
+          </a:p>
+          <a:p>
+            <a:pPr lvl="0"/>
+            <a:r>
+              <a:rPr lang="de-DE" dirty="0"/>
+              <a:t>Die Ergebnisse der </a:t>
+            </a:r>
+            <a:r>
+              <a:rPr lang="de-DE" dirty="0" err="1" smtClean="0"/>
+              <a:t>OpenCL</a:t>
+            </a:r>
+            <a:r>
+              <a:rPr lang="de-DE" dirty="0" smtClean="0"/>
+              <a:t>-Lösung (GPU </a:t>
+            </a:r>
+            <a:r>
+              <a:rPr lang="de-DE" dirty="0" err="1" smtClean="0"/>
+              <a:t>vs</a:t>
+            </a:r>
+            <a:r>
+              <a:rPr lang="de-DE" dirty="0" smtClean="0"/>
+              <a:t> FPGA) </a:t>
+            </a:r>
+            <a:r>
+              <a:rPr lang="de-DE" smtClean="0"/>
+              <a:t>unterscheiden sich</a:t>
+            </a:r>
+            <a:endParaRPr lang="de-DE" dirty="0" smtClean="0"/>
           </a:p>
           <a:p>
             <a:r>
@@ -7524,16 +7551,12 @@
           </a:p>
           <a:p>
             <a:r>
-              <a:rPr lang="de-DE" smtClean="0"/>
-              <a:t>Sehr viel </a:t>
-            </a:r>
-            <a:r>
               <a:rPr lang="de-DE" dirty="0" smtClean="0"/>
-              <a:t>höherer Entwicklungsaufwand für die </a:t>
-            </a:r>
-            <a:r>
-              <a:rPr lang="de-DE" smtClean="0"/>
-              <a:t>VHDL Lösung</a:t>
+              <a:t>Sehr viel höherer Entwicklungsaufwand für die VHDL </a:t>
+            </a:r>
+            <a:r>
+              <a:rPr lang="de-DE" dirty="0" smtClean="0"/>
+              <a:t>Lösung</a:t>
             </a:r>
             <a:endParaRPr lang="de-DE" dirty="0" smtClean="0"/>
           </a:p>
@@ -7547,7 +7570,7 @@
           <p:cNvPr id="4" name="Fußzeilenplatzhalter 3">
             <a:extLst>
               <a:ext uri="{FF2B5EF4-FFF2-40B4-BE49-F238E27FC236}">
-                <a16:creationId xmlns="" xmlns:a16="http://schemas.microsoft.com/office/drawing/2014/main" id="{66F2FD68-A385-4A5A-82BB-108B4682803C}"/>
+                <a16:creationId xmlns:a16="http://schemas.microsoft.com/office/drawing/2014/main" xmlns="" id="{66F2FD68-A385-4A5A-82BB-108B4682803C}"/>
               </a:ext>
             </a:extLst>
           </p:cNvPr>
@@ -7605,7 +7628,7 @@
           <p:cNvPr id="2" name="Titel 1">
             <a:extLst>
               <a:ext uri="{FF2B5EF4-FFF2-40B4-BE49-F238E27FC236}">
-                <a16:creationId xmlns="" xmlns:a16="http://schemas.microsoft.com/office/drawing/2014/main" id="{0529C191-2FA4-420C-8CDE-625C270054F9}"/>
+                <a16:creationId xmlns:a16="http://schemas.microsoft.com/office/drawing/2014/main" xmlns="" id="{0529C191-2FA4-420C-8CDE-625C270054F9}"/>
               </a:ext>
             </a:extLst>
           </p:cNvPr>
@@ -7633,7 +7656,7 @@
           <p:cNvPr id="3" name="Textplatzhalter 2">
             <a:extLst>
               <a:ext uri="{FF2B5EF4-FFF2-40B4-BE49-F238E27FC236}">
-                <a16:creationId xmlns="" xmlns:a16="http://schemas.microsoft.com/office/drawing/2014/main" id="{74D8B0BB-964D-4766-8243-C38AE0AFC304}"/>
+                <a16:creationId xmlns:a16="http://schemas.microsoft.com/office/drawing/2014/main" xmlns="" id="{74D8B0BB-964D-4766-8243-C38AE0AFC304}"/>
               </a:ext>
             </a:extLst>
           </p:cNvPr>
@@ -7658,7 +7681,7 @@
           <p:cNvPr id="4" name="Fußzeilenplatzhalter 3">
             <a:extLst>
               <a:ext uri="{FF2B5EF4-FFF2-40B4-BE49-F238E27FC236}">
-                <a16:creationId xmlns="" xmlns:a16="http://schemas.microsoft.com/office/drawing/2014/main" id="{AE7C686D-C715-46E7-B50C-5436AF564484}"/>
+                <a16:creationId xmlns:a16="http://schemas.microsoft.com/office/drawing/2014/main" xmlns="" id="{AE7C686D-C715-46E7-B50C-5436AF564484}"/>
               </a:ext>
             </a:extLst>
           </p:cNvPr>

</xml_diff>

<commit_message>
Added lbp in presentation
</commit_message>
<xml_diff>
--- a/Projektdokumente/Team 5a.pptx
+++ b/Projektdokumente/Team 5a.pptx
@@ -5,19 +5,20 @@
     <p:sldMasterId id="2147483678" r:id="rId1"/>
   </p:sldMasterIdLst>
   <p:notesMasterIdLst>
-    <p:notesMasterId r:id="rId12"/>
+    <p:notesMasterId r:id="rId13"/>
   </p:notesMasterIdLst>
   <p:sldIdLst>
     <p:sldId id="256" r:id="rId2"/>
     <p:sldId id="257" r:id="rId3"/>
     <p:sldId id="258" r:id="rId4"/>
-    <p:sldId id="259" r:id="rId5"/>
-    <p:sldId id="260" r:id="rId6"/>
-    <p:sldId id="261" r:id="rId7"/>
-    <p:sldId id="262" r:id="rId8"/>
-    <p:sldId id="263" r:id="rId9"/>
-    <p:sldId id="265" r:id="rId10"/>
-    <p:sldId id="264" r:id="rId11"/>
+    <p:sldId id="266" r:id="rId5"/>
+    <p:sldId id="259" r:id="rId6"/>
+    <p:sldId id="260" r:id="rId7"/>
+    <p:sldId id="261" r:id="rId8"/>
+    <p:sldId id="262" r:id="rId9"/>
+    <p:sldId id="263" r:id="rId10"/>
+    <p:sldId id="265" r:id="rId11"/>
+    <p:sldId id="264" r:id="rId12"/>
   </p:sldIdLst>
   <p:sldSz cx="12192000" cy="6858000"/>
   <p:notesSz cx="6858000" cy="9144000"/>
@@ -206,7 +207,7 @@
           <a:p>
             <a:fld id="{35E4980F-7A2F-4229-9EEF-403BC7327AE5}" type="datetimeFigureOut">
               <a:rPr lang="de-DE" smtClean="0"/>
-              <a:t>21.09.17</a:t>
+              <a:t>21.09.2017</a:t>
             </a:fld>
             <a:endParaRPr lang="de-DE"/>
           </a:p>
@@ -364,7 +365,7 @@
           <a:p>
             <a:fld id="{D631D434-4A4B-4A5C-BA91-533FE54EF121}" type="slidenum">
               <a:rPr lang="de-DE" smtClean="0"/>
-              <a:t>‹#›</a:t>
+              <a:t>‹Nr.›</a:t>
             </a:fld>
             <a:endParaRPr lang="de-DE"/>
           </a:p>
@@ -1195,7 +1196,7 @@
           <a:p>
             <a:fld id="{5EE74383-BFB2-4D88-95FA-818D572F9DCA}" type="datetime1">
               <a:rPr lang="de-DE" smtClean="0"/>
-              <a:t>21.09.17</a:t>
+              <a:t>21.09.2017</a:t>
             </a:fld>
             <a:endParaRPr lang="de-DE"/>
           </a:p>
@@ -1240,7 +1241,7 @@
           <a:p>
             <a:fld id="{D4124798-C343-4365-82D2-555E600A8E3B}" type="slidenum">
               <a:rPr lang="de-DE" smtClean="0"/>
-              <a:t>‹#›</a:t>
+              <a:t>‹Nr.›</a:t>
             </a:fld>
             <a:endParaRPr lang="de-DE"/>
           </a:p>
@@ -1449,7 +1450,7 @@
           <a:p>
             <a:fld id="{6A488746-A9E0-4C64-8578-78AC9AE8AC05}" type="datetime1">
               <a:rPr lang="de-DE" smtClean="0"/>
-              <a:t>21.09.17</a:t>
+              <a:t>21.09.2017</a:t>
             </a:fld>
             <a:endParaRPr lang="de-DE"/>
           </a:p>
@@ -1494,7 +1495,7 @@
           <a:p>
             <a:fld id="{D4124798-C343-4365-82D2-555E600A8E3B}" type="slidenum">
               <a:rPr lang="de-DE" smtClean="0"/>
-              <a:t>‹#›</a:t>
+              <a:t>‹Nr.›</a:t>
             </a:fld>
             <a:endParaRPr lang="de-DE"/>
           </a:p>
@@ -1766,7 +1767,7 @@
           <a:p>
             <a:fld id="{030B4F9B-6562-4743-BDB0-A7782BA56A0A}" type="datetime1">
               <a:rPr lang="de-DE" smtClean="0"/>
-              <a:t>21.09.17</a:t>
+              <a:t>21.09.2017</a:t>
             </a:fld>
             <a:endParaRPr lang="de-DE"/>
           </a:p>
@@ -1811,7 +1812,7 @@
           <a:p>
             <a:fld id="{D4124798-C343-4365-82D2-555E600A8E3B}" type="slidenum">
               <a:rPr lang="de-DE" smtClean="0"/>
-              <a:t>‹#›</a:t>
+              <a:t>‹Nr.›</a:t>
             </a:fld>
             <a:endParaRPr lang="de-DE"/>
           </a:p>
@@ -2110,7 +2111,7 @@
           <a:p>
             <a:fld id="{49FA5B3F-C17D-4DD5-ADB3-692A6FDA3CA7}" type="datetime1">
               <a:rPr lang="de-DE" smtClean="0"/>
-              <a:t>21.09.17</a:t>
+              <a:t>21.09.2017</a:t>
             </a:fld>
             <a:endParaRPr lang="de-DE"/>
           </a:p>
@@ -2155,7 +2156,7 @@
           <a:p>
             <a:fld id="{D4124798-C343-4365-82D2-555E600A8E3B}" type="slidenum">
               <a:rPr lang="de-DE" smtClean="0"/>
-              <a:t>‹#›</a:t>
+              <a:t>‹Nr.›</a:t>
             </a:fld>
             <a:endParaRPr lang="de-DE"/>
           </a:p>
@@ -2427,7 +2428,7 @@
           <a:p>
             <a:fld id="{1B6199AC-EAED-4E3A-AB3A-9246F655FD54}" type="datetime1">
               <a:rPr lang="de-DE" smtClean="0"/>
-              <a:t>21.09.17</a:t>
+              <a:t>21.09.2017</a:t>
             </a:fld>
             <a:endParaRPr lang="de-DE"/>
           </a:p>
@@ -2472,7 +2473,7 @@
           <a:p>
             <a:fld id="{D4124798-C343-4365-82D2-555E600A8E3B}" type="slidenum">
               <a:rPr lang="de-DE" smtClean="0"/>
-              <a:t>‹#›</a:t>
+              <a:t>‹Nr.›</a:t>
             </a:fld>
             <a:endParaRPr lang="de-DE"/>
           </a:p>
@@ -2823,7 +2824,7 @@
           <a:p>
             <a:fld id="{40560B96-ADD5-4FB9-8560-2495F52946D0}" type="datetime1">
               <a:rPr lang="de-DE" smtClean="0"/>
-              <a:t>21.09.17</a:t>
+              <a:t>21.09.2017</a:t>
             </a:fld>
             <a:endParaRPr lang="de-DE"/>
           </a:p>
@@ -2868,7 +2869,7 @@
           <a:p>
             <a:fld id="{D4124798-C343-4365-82D2-555E600A8E3B}" type="slidenum">
               <a:rPr lang="de-DE" smtClean="0"/>
-              <a:t>‹#›</a:t>
+              <a:t>‹Nr.›</a:t>
             </a:fld>
             <a:endParaRPr lang="de-DE"/>
           </a:p>
@@ -2996,7 +2997,7 @@
           <a:p>
             <a:fld id="{59FAFE30-6FB4-490C-A09A-DEA60CC19F05}" type="datetime1">
               <a:rPr lang="de-DE" smtClean="0"/>
-              <a:t>21.09.17</a:t>
+              <a:t>21.09.2017</a:t>
             </a:fld>
             <a:endParaRPr lang="de-DE"/>
           </a:p>
@@ -3041,7 +3042,7 @@
           <a:p>
             <a:fld id="{D4124798-C343-4365-82D2-555E600A8E3B}" type="slidenum">
               <a:rPr lang="de-DE" smtClean="0"/>
-              <a:t>‹#›</a:t>
+              <a:t>‹Nr.›</a:t>
             </a:fld>
             <a:endParaRPr lang="de-DE"/>
           </a:p>
@@ -3179,7 +3180,7 @@
           <a:p>
             <a:fld id="{CAFBB611-0F57-40D3-853B-A106752AE97D}" type="datetime1">
               <a:rPr lang="de-DE" smtClean="0"/>
-              <a:t>21.09.17</a:t>
+              <a:t>21.09.2017</a:t>
             </a:fld>
             <a:endParaRPr lang="de-DE"/>
           </a:p>
@@ -3224,7 +3225,7 @@
           <a:p>
             <a:fld id="{D4124798-C343-4365-82D2-555E600A8E3B}" type="slidenum">
               <a:rPr lang="de-DE" smtClean="0"/>
-              <a:t>‹#›</a:t>
+              <a:t>‹Nr.›</a:t>
             </a:fld>
             <a:endParaRPr lang="de-DE"/>
           </a:p>
@@ -3358,7 +3359,7 @@
           <a:p>
             <a:fld id="{1F49B2C8-A340-4693-9CB6-4FEFCE8CC575}" type="datetime1">
               <a:rPr lang="de-DE" smtClean="0"/>
-              <a:t>21.09.17</a:t>
+              <a:t>21.09.2017</a:t>
             </a:fld>
             <a:endParaRPr lang="de-DE"/>
           </a:p>
@@ -3403,7 +3404,7 @@
           <a:p>
             <a:fld id="{D4124798-C343-4365-82D2-555E600A8E3B}" type="slidenum">
               <a:rPr lang="de-DE" smtClean="0"/>
-              <a:t>‹#›</a:t>
+              <a:t>‹Nr.›</a:t>
             </a:fld>
             <a:endParaRPr lang="de-DE"/>
           </a:p>
@@ -3608,7 +3609,7 @@
           <a:p>
             <a:fld id="{A0E7D7AD-8482-4A9E-A9EF-D83CE5EF2BB4}" type="datetime1">
               <a:rPr lang="de-DE" smtClean="0"/>
-              <a:t>21.09.17</a:t>
+              <a:t>21.09.2017</a:t>
             </a:fld>
             <a:endParaRPr lang="de-DE"/>
           </a:p>
@@ -3653,7 +3654,7 @@
           <a:p>
             <a:fld id="{D4124798-C343-4365-82D2-555E600A8E3B}" type="slidenum">
               <a:rPr lang="de-DE" smtClean="0"/>
-              <a:t>‹#›</a:t>
+              <a:t>‹Nr.›</a:t>
             </a:fld>
             <a:endParaRPr lang="de-DE"/>
           </a:p>
@@ -3843,7 +3844,7 @@
           <a:p>
             <a:fld id="{C792654D-96F2-4CB2-A784-1D655A51676D}" type="datetime1">
               <a:rPr lang="de-DE" smtClean="0"/>
-              <a:t>21.09.17</a:t>
+              <a:t>21.09.2017</a:t>
             </a:fld>
             <a:endParaRPr lang="de-DE"/>
           </a:p>
@@ -3888,7 +3889,7 @@
           <a:p>
             <a:fld id="{D4124798-C343-4365-82D2-555E600A8E3B}" type="slidenum">
               <a:rPr lang="de-DE" smtClean="0"/>
-              <a:t>‹#›</a:t>
+              <a:t>‹Nr.›</a:t>
             </a:fld>
             <a:endParaRPr lang="de-DE"/>
           </a:p>
@@ -4220,7 +4221,7 @@
           <a:p>
             <a:fld id="{5197B878-0DDE-4AD6-8DE0-7A18B2F95EFF}" type="datetime1">
               <a:rPr lang="de-DE" smtClean="0"/>
-              <a:t>21.09.17</a:t>
+              <a:t>21.09.2017</a:t>
             </a:fld>
             <a:endParaRPr lang="de-DE"/>
           </a:p>
@@ -4265,7 +4266,7 @@
           <a:p>
             <a:fld id="{D4124798-C343-4365-82D2-555E600A8E3B}" type="slidenum">
               <a:rPr lang="de-DE" smtClean="0"/>
-              <a:t>‹#›</a:t>
+              <a:t>‹Nr.›</a:t>
             </a:fld>
             <a:endParaRPr lang="de-DE"/>
           </a:p>
@@ -4346,7 +4347,7 @@
           <a:p>
             <a:fld id="{29ABC916-24E7-4918-8C30-21E6FDD67243}" type="datetime1">
               <a:rPr lang="de-DE" smtClean="0"/>
-              <a:t>21.09.17</a:t>
+              <a:t>21.09.2017</a:t>
             </a:fld>
             <a:endParaRPr lang="de-DE"/>
           </a:p>
@@ -4391,7 +4392,7 @@
           <a:p>
             <a:fld id="{D4124798-C343-4365-82D2-555E600A8E3B}" type="slidenum">
               <a:rPr lang="de-DE" smtClean="0"/>
-              <a:t>‹#›</a:t>
+              <a:t>‹Nr.›</a:t>
             </a:fld>
             <a:endParaRPr lang="de-DE"/>
           </a:p>
@@ -4444,7 +4445,7 @@
           <a:p>
             <a:fld id="{DEE2B438-E97A-4940-8C4F-FDA2A5551469}" type="datetime1">
               <a:rPr lang="de-DE" smtClean="0"/>
-              <a:t>21.09.17</a:t>
+              <a:t>21.09.2017</a:t>
             </a:fld>
             <a:endParaRPr lang="de-DE"/>
           </a:p>
@@ -4489,7 +4490,7 @@
           <a:p>
             <a:fld id="{D4124798-C343-4365-82D2-555E600A8E3B}" type="slidenum">
               <a:rPr lang="de-DE" smtClean="0"/>
-              <a:t>‹#›</a:t>
+              <a:t>‹Nr.›</a:t>
             </a:fld>
             <a:endParaRPr lang="de-DE"/>
           </a:p>
@@ -4702,7 +4703,7 @@
           <a:p>
             <a:fld id="{AE6FAC99-BE8A-44A0-BFC6-582CA3A2B8E6}" type="datetime1">
               <a:rPr lang="de-DE" smtClean="0"/>
-              <a:t>21.09.17</a:t>
+              <a:t>21.09.2017</a:t>
             </a:fld>
             <a:endParaRPr lang="de-DE"/>
           </a:p>
@@ -4747,7 +4748,7 @@
           <a:p>
             <a:fld id="{D4124798-C343-4365-82D2-555E600A8E3B}" type="slidenum">
               <a:rPr lang="de-DE" smtClean="0"/>
-              <a:t>‹#›</a:t>
+              <a:t>‹Nr.›</a:t>
             </a:fld>
             <a:endParaRPr lang="de-DE"/>
           </a:p>
@@ -4968,7 +4969,7 @@
           <a:p>
             <a:fld id="{5146008D-E671-44B8-B485-1B18990DE070}" type="datetime1">
               <a:rPr lang="de-DE" smtClean="0"/>
-              <a:t>21.09.17</a:t>
+              <a:t>21.09.2017</a:t>
             </a:fld>
             <a:endParaRPr lang="de-DE"/>
           </a:p>
@@ -5013,7 +5014,7 @@
           <a:p>
             <a:fld id="{D4124798-C343-4365-82D2-555E600A8E3B}" type="slidenum">
               <a:rPr lang="de-DE" smtClean="0"/>
-              <a:t>‹#›</a:t>
+              <a:t>‹Nr.›</a:t>
             </a:fld>
             <a:endParaRPr lang="de-DE"/>
           </a:p>
@@ -5714,7 +5715,7 @@
           <a:p>
             <a:fld id="{779B8B36-40B9-42E1-BCDC-83164CCEB6EF}" type="datetime1">
               <a:rPr lang="de-DE" smtClean="0"/>
-              <a:t>21.09.17</a:t>
+              <a:t>21.09.2017</a:t>
             </a:fld>
             <a:endParaRPr lang="de-DE"/>
           </a:p>
@@ -5793,7 +5794,7 @@
           <a:p>
             <a:fld id="{D4124798-C343-4365-82D2-555E600A8E3B}" type="slidenum">
               <a:rPr lang="de-DE" smtClean="0"/>
-              <a:t>‹#›</a:t>
+              <a:t>‹Nr.›</a:t>
             </a:fld>
             <a:endParaRPr lang="de-DE"/>
           </a:p>
@@ -6247,7 +6248,7 @@
           <p:cNvPr id="2" name="Titel 1">
             <a:extLst>
               <a:ext uri="{FF2B5EF4-FFF2-40B4-BE49-F238E27FC236}">
-                <a16:creationId xmlns:a16="http://schemas.microsoft.com/office/drawing/2014/main" xmlns="" id="{50D9F900-C13B-4A28-B9A3-056BC0F43CD1}"/>
+                <a16:creationId xmlns="" xmlns:a16="http://schemas.microsoft.com/office/drawing/2014/main" id="{50D9F900-C13B-4A28-B9A3-056BC0F43CD1}"/>
               </a:ext>
             </a:extLst>
           </p:cNvPr>
@@ -6280,7 +6281,7 @@
           <p:cNvPr id="3" name="Untertitel 2">
             <a:extLst>
               <a:ext uri="{FF2B5EF4-FFF2-40B4-BE49-F238E27FC236}">
-                <a16:creationId xmlns:a16="http://schemas.microsoft.com/office/drawing/2014/main" xmlns="" id="{AB905DCD-48A2-4943-81CB-111D904F9E4A}"/>
+                <a16:creationId xmlns="" xmlns:a16="http://schemas.microsoft.com/office/drawing/2014/main" id="{AB905DCD-48A2-4943-81CB-111D904F9E4A}"/>
               </a:ext>
             </a:extLst>
           </p:cNvPr>
@@ -6335,7 +6336,7 @@
           <p:cNvPr id="5" name="Grafik 4">
             <a:extLst>
               <a:ext uri="{FF2B5EF4-FFF2-40B4-BE49-F238E27FC236}">
-                <a16:creationId xmlns:a16="http://schemas.microsoft.com/office/drawing/2014/main" xmlns="" id="{D2753509-77C2-485A-B3EC-7404AC768E3B}"/>
+                <a16:creationId xmlns="" xmlns:a16="http://schemas.microsoft.com/office/drawing/2014/main" id="{D2753509-77C2-485A-B3EC-7404AC768E3B}"/>
               </a:ext>
             </a:extLst>
           </p:cNvPr>
@@ -6345,7 +6346,7 @@
           <p:nvPr/>
         </p:nvPicPr>
         <p:blipFill>
-          <a:blip r:embed="rId2">
+          <a:blip r:embed="rId2" cstate="print">
             <a:extLst>
               <a:ext uri="{28A0092B-C50C-407E-A947-70E740481C1C}">
                 <a14:useLocalDpi xmlns:a14="http://schemas.microsoft.com/office/drawing/2010/main" val="0"/>
@@ -6401,7 +6402,7 @@
           <p:cNvPr id="2" name="Titel 1">
             <a:extLst>
               <a:ext uri="{FF2B5EF4-FFF2-40B4-BE49-F238E27FC236}">
-                <a16:creationId xmlns:a16="http://schemas.microsoft.com/office/drawing/2014/main" xmlns="" id="{6B33D700-32EC-4BEF-B6A4-9F8D0B1C7ACD}"/>
+                <a16:creationId xmlns="" xmlns:a16="http://schemas.microsoft.com/office/drawing/2014/main" id="{0529C191-2FA4-420C-8CDE-625C270054F9}"/>
               </a:ext>
             </a:extLst>
           </p:cNvPr>
@@ -6414,6 +6415,117 @@
         </p:nvSpPr>
         <p:spPr/>
         <p:txBody>
+          <a:bodyPr/>
+          <a:lstStyle/>
+          <a:p>
+            <a:r>
+              <a:rPr lang="de-DE" dirty="0"/>
+              <a:t>Wechsel zur Vorführung</a:t>
+            </a:r>
+          </a:p>
+        </p:txBody>
+      </p:sp>
+      <p:sp>
+        <p:nvSpPr>
+          <p:cNvPr id="3" name="Textplatzhalter 2">
+            <a:extLst>
+              <a:ext uri="{FF2B5EF4-FFF2-40B4-BE49-F238E27FC236}">
+                <a16:creationId xmlns="" xmlns:a16="http://schemas.microsoft.com/office/drawing/2014/main" id="{74D8B0BB-964D-4766-8243-C38AE0AFC304}"/>
+              </a:ext>
+            </a:extLst>
+          </p:cNvPr>
+          <p:cNvSpPr>
+            <a:spLocks noGrp="1"/>
+          </p:cNvSpPr>
+          <p:nvPr>
+            <p:ph type="body" idx="1"/>
+          </p:nvPr>
+        </p:nvSpPr>
+        <p:spPr/>
+        <p:txBody>
+          <a:bodyPr/>
+          <a:lstStyle/>
+          <a:p>
+            <a:endParaRPr lang="de-DE"/>
+          </a:p>
+        </p:txBody>
+      </p:sp>
+      <p:sp>
+        <p:nvSpPr>
+          <p:cNvPr id="4" name="Fußzeilenplatzhalter 3">
+            <a:extLst>
+              <a:ext uri="{FF2B5EF4-FFF2-40B4-BE49-F238E27FC236}">
+                <a16:creationId xmlns="" xmlns:a16="http://schemas.microsoft.com/office/drawing/2014/main" id="{AE7C686D-C715-46E7-B50C-5436AF564484}"/>
+              </a:ext>
+            </a:extLst>
+          </p:cNvPr>
+          <p:cNvSpPr>
+            <a:spLocks noGrp="1"/>
+          </p:cNvSpPr>
+          <p:nvPr>
+            <p:ph type="ftr" sz="quarter" idx="11"/>
+          </p:nvPr>
+        </p:nvSpPr>
+        <p:spPr/>
+        <p:txBody>
+          <a:bodyPr/>
+          <a:lstStyle/>
+          <a:p>
+            <a:r>
+              <a:rPr lang="de-DE"/>
+              <a:t>Michael Erkel, Sergej Zuyev, Simon Friedrich</a:t>
+            </a:r>
+          </a:p>
+        </p:txBody>
+      </p:sp>
+    </p:spTree>
+    <p:extLst>
+      <p:ext uri="{BB962C8B-B14F-4D97-AF65-F5344CB8AC3E}">
+        <p14:creationId xmlns:p14="http://schemas.microsoft.com/office/powerpoint/2010/main" val="815276268"/>
+      </p:ext>
+    </p:extLst>
+  </p:cSld>
+  <p:clrMapOvr>
+    <a:masterClrMapping/>
+  </p:clrMapOvr>
+</p:sld>
+</file>
+
+<file path=ppt/slides/slide11.xml><?xml version="1.0" encoding="utf-8"?>
+<p:sld xmlns:a="http://schemas.openxmlformats.org/drawingml/2006/main" xmlns:r="http://schemas.openxmlformats.org/officeDocument/2006/relationships" xmlns:p="http://schemas.openxmlformats.org/presentationml/2006/main">
+  <p:cSld>
+    <p:spTree>
+      <p:nvGrpSpPr>
+        <p:cNvPr id="1" name=""/>
+        <p:cNvGrpSpPr/>
+        <p:nvPr/>
+      </p:nvGrpSpPr>
+      <p:grpSpPr>
+        <a:xfrm>
+          <a:off x="0" y="0"/>
+          <a:ext cx="0" cy="0"/>
+          <a:chOff x="0" y="0"/>
+          <a:chExt cx="0" cy="0"/>
+        </a:xfrm>
+      </p:grpSpPr>
+      <p:sp>
+        <p:nvSpPr>
+          <p:cNvPr id="2" name="Titel 1">
+            <a:extLst>
+              <a:ext uri="{FF2B5EF4-FFF2-40B4-BE49-F238E27FC236}">
+                <a16:creationId xmlns="" xmlns:a16="http://schemas.microsoft.com/office/drawing/2014/main" id="{6B33D700-32EC-4BEF-B6A4-9F8D0B1C7ACD}"/>
+              </a:ext>
+            </a:extLst>
+          </p:cNvPr>
+          <p:cNvSpPr>
+            <a:spLocks noGrp="1"/>
+          </p:cNvSpPr>
+          <p:nvPr>
+            <p:ph type="title"/>
+          </p:nvPr>
+        </p:nvSpPr>
+        <p:spPr/>
+        <p:txBody>
           <a:bodyPr>
             <a:noAutofit/>
           </a:bodyPr>
@@ -6431,7 +6543,7 @@
           <p:cNvPr id="3" name="Textplatzhalter 2">
             <a:extLst>
               <a:ext uri="{FF2B5EF4-FFF2-40B4-BE49-F238E27FC236}">
-                <a16:creationId xmlns:a16="http://schemas.microsoft.com/office/drawing/2014/main" xmlns="" id="{6866D80B-647B-41B2-B27B-1294D968D731}"/>
+                <a16:creationId xmlns="" xmlns:a16="http://schemas.microsoft.com/office/drawing/2014/main" id="{6866D80B-647B-41B2-B27B-1294D968D731}"/>
               </a:ext>
             </a:extLst>
           </p:cNvPr>
@@ -6489,7 +6601,7 @@
           <p:cNvPr id="2" name="Titel 1">
             <a:extLst>
               <a:ext uri="{FF2B5EF4-FFF2-40B4-BE49-F238E27FC236}">
-                <a16:creationId xmlns:a16="http://schemas.microsoft.com/office/drawing/2014/main" xmlns="" id="{8787FCCE-9CD5-4A90-8FBC-069678E696E7}"/>
+                <a16:creationId xmlns="" xmlns:a16="http://schemas.microsoft.com/office/drawing/2014/main" id="{8787FCCE-9CD5-4A90-8FBC-069678E696E7}"/>
               </a:ext>
             </a:extLst>
           </p:cNvPr>
@@ -6517,7 +6629,7 @@
           <p:cNvPr id="3" name="Inhaltsplatzhalter 2">
             <a:extLst>
               <a:ext uri="{FF2B5EF4-FFF2-40B4-BE49-F238E27FC236}">
-                <a16:creationId xmlns:a16="http://schemas.microsoft.com/office/drawing/2014/main" xmlns="" id="{7D4D6545-C4AA-41A4-A07A-7AD68269415C}"/>
+                <a16:creationId xmlns="" xmlns:a16="http://schemas.microsoft.com/office/drawing/2014/main" id="{7D4D6545-C4AA-41A4-A07A-7AD68269415C}"/>
               </a:ext>
             </a:extLst>
           </p:cNvPr>
@@ -6534,9 +6646,20 @@
           <a:lstStyle/>
           <a:p>
             <a:r>
-              <a:rPr lang="de-DE" dirty="0"/>
+              <a:rPr lang="de-DE" dirty="0" smtClean="0"/>
               <a:t>Aufgabenstellung</a:t>
             </a:r>
+          </a:p>
+          <a:p>
+            <a:r>
+              <a:rPr lang="de-DE" dirty="0" err="1" smtClean="0"/>
+              <a:t>Local</a:t>
+            </a:r>
+            <a:r>
+              <a:rPr lang="de-DE" dirty="0" smtClean="0"/>
+              <a:t> Binary Pattern (LBP)</a:t>
+            </a:r>
+            <a:endParaRPr lang="de-DE" dirty="0"/>
           </a:p>
           <a:p>
             <a:r>
@@ -6582,7 +6705,7 @@
           <p:cNvPr id="4" name="Fußzeilenplatzhalter 3">
             <a:extLst>
               <a:ext uri="{FF2B5EF4-FFF2-40B4-BE49-F238E27FC236}">
-                <a16:creationId xmlns:a16="http://schemas.microsoft.com/office/drawing/2014/main" xmlns="" id="{05A79631-50EB-4869-AD25-DDE67A9B97F6}"/>
+                <a16:creationId xmlns="" xmlns:a16="http://schemas.microsoft.com/office/drawing/2014/main" id="{05A79631-50EB-4869-AD25-DDE67A9B97F6}"/>
               </a:ext>
             </a:extLst>
           </p:cNvPr>
@@ -6640,7 +6763,7 @@
           <p:cNvPr id="2" name="Titel 1">
             <a:extLst>
               <a:ext uri="{FF2B5EF4-FFF2-40B4-BE49-F238E27FC236}">
-                <a16:creationId xmlns:a16="http://schemas.microsoft.com/office/drawing/2014/main" xmlns="" id="{91F54FE9-D8A4-4AC6-A3E0-6C087F525248}"/>
+                <a16:creationId xmlns="" xmlns:a16="http://schemas.microsoft.com/office/drawing/2014/main" id="{91F54FE9-D8A4-4AC6-A3E0-6C087F525248}"/>
               </a:ext>
             </a:extLst>
           </p:cNvPr>
@@ -6668,7 +6791,7 @@
           <p:cNvPr id="3" name="Inhaltsplatzhalter 2">
             <a:extLst>
               <a:ext uri="{FF2B5EF4-FFF2-40B4-BE49-F238E27FC236}">
-                <a16:creationId xmlns:a16="http://schemas.microsoft.com/office/drawing/2014/main" xmlns="" id="{A2809F03-0F60-4847-BCF4-0688F41E2204}"/>
+                <a16:creationId xmlns="" xmlns:a16="http://schemas.microsoft.com/office/drawing/2014/main" id="{A2809F03-0F60-4847-BCF4-0688F41E2204}"/>
               </a:ext>
             </a:extLst>
           </p:cNvPr>
@@ -6713,7 +6836,7 @@
           <p:cNvPr id="4" name="Fußzeilenplatzhalter 3">
             <a:extLst>
               <a:ext uri="{FF2B5EF4-FFF2-40B4-BE49-F238E27FC236}">
-                <a16:creationId xmlns:a16="http://schemas.microsoft.com/office/drawing/2014/main" xmlns="" id="{64FB9F9C-6B5F-4A35-BC28-17BE63DAE8C3}"/>
+                <a16:creationId xmlns="" xmlns:a16="http://schemas.microsoft.com/office/drawing/2014/main" id="{64FB9F9C-6B5F-4A35-BC28-17BE63DAE8C3}"/>
               </a:ext>
             </a:extLst>
           </p:cNvPr>
@@ -6768,13 +6891,7 @@
       </p:grpSpPr>
       <p:sp>
         <p:nvSpPr>
-          <p:cNvPr id="2" name="Titel 1">
-            <a:extLst>
-              <a:ext uri="{FF2B5EF4-FFF2-40B4-BE49-F238E27FC236}">
-                <a16:creationId xmlns:a16="http://schemas.microsoft.com/office/drawing/2014/main" xmlns="" id="{91F54FE9-D8A4-4AC6-A3E0-6C087F525248}"/>
-              </a:ext>
-            </a:extLst>
-          </p:cNvPr>
+          <p:cNvPr id="2" name="Titel 1"/>
           <p:cNvSpPr>
             <a:spLocks noGrp="1"/>
           </p:cNvSpPr>
@@ -6788,27 +6905,55 @@
           <a:lstStyle/>
           <a:p>
             <a:r>
+              <a:rPr lang="de-DE" dirty="0" err="1"/>
+              <a:t>Local</a:t>
+            </a:r>
+            <a:r>
               <a:rPr lang="de-DE" dirty="0"/>
-              <a:t>Umsetzung</a:t>
-            </a:r>
-          </a:p>
-        </p:txBody>
-      </p:sp>
-      <p:sp>
-        <p:nvSpPr>
-          <p:cNvPr id="3" name="Inhaltsplatzhalter 2">
-            <a:extLst>
-              <a:ext uri="{FF2B5EF4-FFF2-40B4-BE49-F238E27FC236}">
-                <a16:creationId xmlns:a16="http://schemas.microsoft.com/office/drawing/2014/main" xmlns="" id="{A2809F03-0F60-4847-BCF4-0688F41E2204}"/>
-              </a:ext>
-            </a:extLst>
-          </p:cNvPr>
-          <p:cNvSpPr>
-            <a:spLocks noGrp="1"/>
-          </p:cNvSpPr>
+              <a:t> Binary Pattern (LBP)</a:t>
+            </a:r>
+            <a:br>
+              <a:rPr lang="de-DE" dirty="0"/>
+            </a:br>
+            <a:endParaRPr lang="de-DE" dirty="0"/>
+          </a:p>
+        </p:txBody>
+      </p:sp>
+      <p:pic>
+        <p:nvPicPr>
+          <p:cNvPr id="5" name="Inhaltsplatzhalter 4"/>
+          <p:cNvPicPr>
+            <a:picLocks noGrp="1" noChangeAspect="1"/>
+          </p:cNvPicPr>
           <p:nvPr>
             <p:ph idx="1"/>
           </p:nvPr>
+        </p:nvPicPr>
+        <p:blipFill>
+          <a:blip r:embed="rId2"/>
+          <a:stretch>
+            <a:fillRect/>
+          </a:stretch>
+        </p:blipFill>
+        <p:spPr>
+          <a:xfrm>
+            <a:off x="677863" y="3052690"/>
+            <a:ext cx="8596312" cy="2097233"/>
+          </a:xfrm>
+          <a:prstGeom prst="rect">
+            <a:avLst/>
+          </a:prstGeom>
+        </p:spPr>
+      </p:pic>
+      <p:sp>
+        <p:nvSpPr>
+          <p:cNvPr id="4" name="Fußzeilenplatzhalter 3"/>
+          <p:cNvSpPr>
+            <a:spLocks noGrp="1"/>
+          </p:cNvSpPr>
+          <p:nvPr>
+            <p:ph type="ftr" sz="quarter" idx="11"/>
+          </p:nvPr>
         </p:nvSpPr>
         <p:spPr/>
         <p:txBody>
@@ -6816,78 +6961,17 @@
           <a:lstStyle/>
           <a:p>
             <a:r>
-              <a:rPr lang="de-DE" dirty="0"/>
-              <a:t>Analyse Masterarbeit Herr Kumar</a:t>
-            </a:r>
-          </a:p>
-          <a:p>
-            <a:r>
-              <a:rPr lang="de-DE" dirty="0"/>
-              <a:t>Wie Daten zu Board übertragen?</a:t>
-            </a:r>
-          </a:p>
-          <a:p>
-            <a:r>
-              <a:rPr lang="de-DE" dirty="0"/>
-              <a:t>Vergleich der Lösungen</a:t>
-            </a:r>
-          </a:p>
-          <a:p>
-            <a:pPr lvl="1"/>
-            <a:r>
-              <a:rPr lang="de-DE" dirty="0"/>
-              <a:t>Dauer der Berechnung</a:t>
-            </a:r>
-          </a:p>
-          <a:p>
-            <a:pPr lvl="1"/>
-            <a:r>
-              <a:rPr lang="de-DE" dirty="0"/>
-              <a:t>Abweichung zu Referenz in </a:t>
-            </a:r>
-            <a:r>
-              <a:rPr lang="de-DE" dirty="0" err="1"/>
-              <a:t>Matlab</a:t>
-            </a:r>
-            <a:r>
-              <a:rPr lang="de-DE" dirty="0"/>
-              <a:t> (Herr Kumar)</a:t>
-            </a:r>
-          </a:p>
-        </p:txBody>
-      </p:sp>
-      <p:sp>
-        <p:nvSpPr>
-          <p:cNvPr id="4" name="Fußzeilenplatzhalter 3">
-            <a:extLst>
-              <a:ext uri="{FF2B5EF4-FFF2-40B4-BE49-F238E27FC236}">
-                <a16:creationId xmlns:a16="http://schemas.microsoft.com/office/drawing/2014/main" xmlns="" id="{7D981296-08B3-4506-87EB-66A214A27123}"/>
-              </a:ext>
-            </a:extLst>
-          </p:cNvPr>
-          <p:cNvSpPr>
-            <a:spLocks noGrp="1"/>
-          </p:cNvSpPr>
-          <p:nvPr>
-            <p:ph type="ftr" sz="quarter" idx="11"/>
-          </p:nvPr>
-        </p:nvSpPr>
-        <p:spPr/>
-        <p:txBody>
-          <a:bodyPr/>
-          <a:lstStyle/>
-          <a:p>
-            <a:r>
-              <a:rPr lang="de-DE"/>
+              <a:rPr lang="de-DE" smtClean="0"/>
               <a:t>Michael Erkel, Sergej Zuyev, Simon Friedrich</a:t>
             </a:r>
+            <a:endParaRPr lang="de-DE"/>
           </a:p>
         </p:txBody>
       </p:sp>
     </p:spTree>
     <p:extLst>
       <p:ext uri="{BB962C8B-B14F-4D97-AF65-F5344CB8AC3E}">
-        <p14:creationId xmlns:p14="http://schemas.microsoft.com/office/powerpoint/2010/main" val="4162449880"/>
+        <p14:creationId xmlns:p14="http://schemas.microsoft.com/office/powerpoint/2010/main" val="3966029135"/>
       </p:ext>
     </p:extLst>
   </p:cSld>
@@ -6919,7 +7003,7 @@
           <p:cNvPr id="2" name="Titel 1">
             <a:extLst>
               <a:ext uri="{FF2B5EF4-FFF2-40B4-BE49-F238E27FC236}">
-                <a16:creationId xmlns:a16="http://schemas.microsoft.com/office/drawing/2014/main" xmlns="" id="{0BF7D0A5-5D28-4AB2-B51B-7F02CB0BD852}"/>
+                <a16:creationId xmlns="" xmlns:a16="http://schemas.microsoft.com/office/drawing/2014/main" id="{91F54FE9-D8A4-4AC6-A3E0-6C087F525248}"/>
               </a:ext>
             </a:extLst>
           </p:cNvPr>
@@ -6937,7 +7021,7 @@
           <a:p>
             <a:r>
               <a:rPr lang="de-DE" dirty="0"/>
-              <a:t>Darstellung</a:t>
+              <a:t>Umsetzung</a:t>
             </a:r>
           </a:p>
         </p:txBody>
@@ -6947,7 +7031,7 @@
           <p:cNvPr id="3" name="Inhaltsplatzhalter 2">
             <a:extLst>
               <a:ext uri="{FF2B5EF4-FFF2-40B4-BE49-F238E27FC236}">
-                <a16:creationId xmlns:a16="http://schemas.microsoft.com/office/drawing/2014/main" xmlns="" id="{464CE860-7206-4C2F-B398-2162152088AD}"/>
+                <a16:creationId xmlns="" xmlns:a16="http://schemas.microsoft.com/office/drawing/2014/main" id="{A2809F03-0F60-4847-BCF4-0688F41E2204}"/>
               </a:ext>
             </a:extLst>
           </p:cNvPr>
@@ -6964,46 +7048,43 @@
           <a:lstStyle/>
           <a:p>
             <a:r>
+              <a:rPr lang="de-DE" dirty="0"/>
+              <a:t>Analyse Masterarbeit Herr Kumar</a:t>
+            </a:r>
+          </a:p>
+          <a:p>
+            <a:r>
+              <a:rPr lang="de-DE" dirty="0"/>
+              <a:t>Wie Daten zu Board übertragen?</a:t>
+            </a:r>
+          </a:p>
+          <a:p>
+            <a:r>
+              <a:rPr lang="de-DE" dirty="0"/>
+              <a:t>Vergleich der Lösungen</a:t>
+            </a:r>
+          </a:p>
+          <a:p>
+            <a:pPr lvl="1"/>
+            <a:r>
+              <a:rPr lang="de-DE" dirty="0"/>
+              <a:t>Dauer der Berechnung</a:t>
+            </a:r>
+          </a:p>
+          <a:p>
+            <a:pPr lvl="1"/>
+            <a:r>
+              <a:rPr lang="de-DE" dirty="0"/>
+              <a:t>Abweichung zu Referenz in </a:t>
+            </a:r>
+            <a:r>
               <a:rPr lang="de-DE" dirty="0" err="1"/>
-              <a:t>MATlab</a:t>
+              <a:t>Matlab</a:t>
             </a:r>
             <a:r>
               <a:rPr lang="de-DE" dirty="0"/>
-              <a:t> Anwendung</a:t>
-            </a:r>
-          </a:p>
-          <a:p>
-            <a:r>
-              <a:rPr lang="de-DE" dirty="0"/>
-              <a:t>Tabellarische Darstellung der Messungen</a:t>
-            </a:r>
-          </a:p>
-          <a:p>
-            <a:r>
-              <a:rPr lang="de-DE" dirty="0"/>
-              <a:t>Übertragung der Daten</a:t>
-            </a:r>
-          </a:p>
-          <a:p>
-            <a:r>
-              <a:rPr lang="de-DE" dirty="0"/>
-              <a:t>Verfügbarer LBP von Herr Kumar in </a:t>
-            </a:r>
-            <a:r>
-              <a:rPr lang="de-DE" dirty="0" err="1"/>
-              <a:t>MATlab</a:t>
-            </a:r>
-            <a:endParaRPr lang="de-DE" dirty="0"/>
-          </a:p>
-          <a:p>
-            <a:pPr lvl="1"/>
-            <a:r>
-              <a:rPr lang="de-DE" dirty="0"/>
-              <a:t>Referenz für Abweichung</a:t>
-            </a:r>
-          </a:p>
-          <a:p>
-            <a:endParaRPr lang="de-DE" dirty="0"/>
+              <a:t> (Herr Kumar)</a:t>
+            </a:r>
           </a:p>
         </p:txBody>
       </p:sp>
@@ -7012,7 +7093,7 @@
           <p:cNvPr id="4" name="Fußzeilenplatzhalter 3">
             <a:extLst>
               <a:ext uri="{FF2B5EF4-FFF2-40B4-BE49-F238E27FC236}">
-                <a16:creationId xmlns:a16="http://schemas.microsoft.com/office/drawing/2014/main" xmlns="" id="{BCF15641-D365-465E-BB4A-4827CC0864F9}"/>
+                <a16:creationId xmlns="" xmlns:a16="http://schemas.microsoft.com/office/drawing/2014/main" id="{7D981296-08B3-4506-87EB-66A214A27123}"/>
               </a:ext>
             </a:extLst>
           </p:cNvPr>
@@ -7038,7 +7119,7 @@
     </p:spTree>
     <p:extLst>
       <p:ext uri="{BB962C8B-B14F-4D97-AF65-F5344CB8AC3E}">
-        <p14:creationId xmlns:p14="http://schemas.microsoft.com/office/powerpoint/2010/main" val="454677030"/>
+        <p14:creationId xmlns:p14="http://schemas.microsoft.com/office/powerpoint/2010/main" val="4162449880"/>
       </p:ext>
     </p:extLst>
   </p:cSld>
@@ -7070,7 +7151,7 @@
           <p:cNvPr id="2" name="Titel 1">
             <a:extLst>
               <a:ext uri="{FF2B5EF4-FFF2-40B4-BE49-F238E27FC236}">
-                <a16:creationId xmlns:a16="http://schemas.microsoft.com/office/drawing/2014/main" xmlns="" id="{1F4C0B71-DDF0-4CA0-A2B1-66C9D0455069}"/>
+                <a16:creationId xmlns="" xmlns:a16="http://schemas.microsoft.com/office/drawing/2014/main" id="{0BF7D0A5-5D28-4AB2-B51B-7F02CB0BD852}"/>
               </a:ext>
             </a:extLst>
           </p:cNvPr>
@@ -7087,10 +7168,9 @@
           <a:lstStyle/>
           <a:p>
             <a:r>
-              <a:rPr lang="de-DE" dirty="0" err="1"/>
-              <a:t>OpenCL</a:t>
-            </a:r>
-            <a:endParaRPr lang="de-DE" dirty="0"/>
+              <a:rPr lang="de-DE" dirty="0"/>
+              <a:t>Darstellung</a:t>
+            </a:r>
           </a:p>
         </p:txBody>
       </p:sp>
@@ -7099,7 +7179,7 @@
           <p:cNvPr id="3" name="Inhaltsplatzhalter 2">
             <a:extLst>
               <a:ext uri="{FF2B5EF4-FFF2-40B4-BE49-F238E27FC236}">
-                <a16:creationId xmlns:a16="http://schemas.microsoft.com/office/drawing/2014/main" xmlns="" id="{FC97EE4E-D42B-46E9-9E93-A6D4E2E15913}"/>
+                <a16:creationId xmlns="" xmlns:a16="http://schemas.microsoft.com/office/drawing/2014/main" id="{464CE860-7206-4C2F-B398-2162152088AD}"/>
               </a:ext>
             </a:extLst>
           </p:cNvPr>
@@ -7116,89 +7196,46 @@
           <a:lstStyle/>
           <a:p>
             <a:r>
-              <a:rPr lang="de-DE" dirty="0" smtClean="0"/>
-              <a:t>2 Varianten entworfen</a:t>
-            </a:r>
-          </a:p>
-          <a:p>
-            <a:r>
-              <a:rPr lang="de-DE" dirty="0" smtClean="0"/>
-              <a:t>Beide sind auf der Grafikkarte lauffähig</a:t>
-            </a:r>
-          </a:p>
-          <a:p>
-            <a:r>
-              <a:rPr lang="de-DE" dirty="0" smtClean="0"/>
-              <a:t>Eine ist auf dem DE1-SoC lauffähig</a:t>
-            </a:r>
-          </a:p>
-          <a:p>
-            <a:r>
-              <a:rPr lang="de-DE" dirty="0" smtClean="0"/>
-              <a:t>Hostprogramm zur Ausführung in C/C++</a:t>
-            </a:r>
-          </a:p>
-          <a:p>
-            <a:r>
-              <a:rPr lang="de-DE" dirty="0" smtClean="0"/>
-              <a:t>Kommunikation mit </a:t>
-            </a:r>
-            <a:r>
-              <a:rPr lang="de-DE" dirty="0" err="1" smtClean="0"/>
-              <a:t>Matlab</a:t>
-            </a:r>
-            <a:r>
-              <a:rPr lang="de-DE" dirty="0" smtClean="0"/>
-              <a:t> via SSH/SCP</a:t>
-            </a:r>
-          </a:p>
-          <a:p>
-            <a:r>
-              <a:rPr lang="de-DE" dirty="0" smtClean="0"/>
-              <a:t>Sehr langsam! (</a:t>
-            </a:r>
-            <a:r>
-              <a:rPr lang="de-DE" dirty="0" err="1" smtClean="0"/>
-              <a:t>ca</a:t>
-            </a:r>
-            <a:r>
-              <a:rPr lang="de-DE" dirty="0" smtClean="0"/>
-              <a:t> 46s für ein 256x256 Bild, 1 Kernel)</a:t>
-            </a:r>
-          </a:p>
-          <a:p>
-            <a:r>
-              <a:rPr lang="de-DE" dirty="0" smtClean="0"/>
-              <a:t>Mehr Kernels != schneller (</a:t>
-            </a:r>
-            <a:r>
-              <a:rPr lang="de-DE" dirty="0" err="1" smtClean="0"/>
-              <a:t>ca</a:t>
-            </a:r>
-            <a:r>
-              <a:rPr lang="de-DE" dirty="0" smtClean="0"/>
-              <a:t> 56s für ein 256x256 Bild, 4 Kernel)</a:t>
-            </a:r>
-          </a:p>
-          <a:p>
-            <a:r>
-              <a:rPr lang="de-DE" dirty="0" smtClean="0"/>
-              <a:t>Probleme beim </a:t>
-            </a:r>
-            <a:r>
-              <a:rPr lang="de-DE" dirty="0" err="1" smtClean="0"/>
-              <a:t>konkurrenten</a:t>
-            </a:r>
-            <a:r>
-              <a:rPr lang="de-DE" dirty="0" smtClean="0"/>
-              <a:t> Speicherzugriff?</a:t>
-            </a:r>
-          </a:p>
-          <a:p>
-            <a:r>
-              <a:rPr lang="de-DE" dirty="0" smtClean="0"/>
-              <a:t>Selber Code, unterschiedliche Ergebnisse auf Grafikkarte bzw. FPGA</a:t>
-            </a:r>
+              <a:rPr lang="de-DE" dirty="0" err="1"/>
+              <a:t>MATlab</a:t>
+            </a:r>
+            <a:r>
+              <a:rPr lang="de-DE" dirty="0"/>
+              <a:t> Anwendung</a:t>
+            </a:r>
+          </a:p>
+          <a:p>
+            <a:r>
+              <a:rPr lang="de-DE" dirty="0"/>
+              <a:t>Tabellarische Darstellung der Messungen</a:t>
+            </a:r>
+          </a:p>
+          <a:p>
+            <a:r>
+              <a:rPr lang="de-DE" dirty="0"/>
+              <a:t>Übertragung der Daten</a:t>
+            </a:r>
+          </a:p>
+          <a:p>
+            <a:r>
+              <a:rPr lang="de-DE" dirty="0"/>
+              <a:t>Verfügbarer LBP von Herr Kumar in </a:t>
+            </a:r>
+            <a:r>
+              <a:rPr lang="de-DE" dirty="0" err="1"/>
+              <a:t>MATlab</a:t>
+            </a:r>
+            <a:endParaRPr lang="de-DE" dirty="0"/>
+          </a:p>
+          <a:p>
+            <a:pPr lvl="1"/>
+            <a:r>
+              <a:rPr lang="de-DE" dirty="0"/>
+              <a:t>Referenz für Abweichung</a:t>
+            </a:r>
+          </a:p>
+          <a:p>
+            <a:endParaRPr lang="de-DE" dirty="0"/>
           </a:p>
         </p:txBody>
       </p:sp>
@@ -7207,7 +7244,7 @@
           <p:cNvPr id="4" name="Fußzeilenplatzhalter 3">
             <a:extLst>
               <a:ext uri="{FF2B5EF4-FFF2-40B4-BE49-F238E27FC236}">
-                <a16:creationId xmlns:a16="http://schemas.microsoft.com/office/drawing/2014/main" xmlns="" id="{F9986648-D8E9-42C3-848F-0F780D53C173}"/>
+                <a16:creationId xmlns="" xmlns:a16="http://schemas.microsoft.com/office/drawing/2014/main" id="{BCF15641-D365-465E-BB4A-4827CC0864F9}"/>
               </a:ext>
             </a:extLst>
           </p:cNvPr>
@@ -7233,7 +7270,7 @@
     </p:spTree>
     <p:extLst>
       <p:ext uri="{BB962C8B-B14F-4D97-AF65-F5344CB8AC3E}">
-        <p14:creationId xmlns:p14="http://schemas.microsoft.com/office/powerpoint/2010/main" val="1622247769"/>
+        <p14:creationId xmlns:p14="http://schemas.microsoft.com/office/powerpoint/2010/main" val="454677030"/>
       </p:ext>
     </p:extLst>
   </p:cSld>
@@ -7265,7 +7302,7 @@
           <p:cNvPr id="2" name="Titel 1">
             <a:extLst>
               <a:ext uri="{FF2B5EF4-FFF2-40B4-BE49-F238E27FC236}">
-                <a16:creationId xmlns:a16="http://schemas.microsoft.com/office/drawing/2014/main" xmlns="" id="{8B6B458A-A4CA-433F-AAAD-8FC04CABFF33}"/>
+                <a16:creationId xmlns="" xmlns:a16="http://schemas.microsoft.com/office/drawing/2014/main" id="{1F4C0B71-DDF0-4CA0-A2B1-66C9D0455069}"/>
               </a:ext>
             </a:extLst>
           </p:cNvPr>
@@ -7282,9 +7319,10 @@
           <a:lstStyle/>
           <a:p>
             <a:r>
-              <a:rPr lang="de-DE" dirty="0"/>
-              <a:t>VHDL</a:t>
-            </a:r>
+              <a:rPr lang="de-DE" dirty="0" err="1"/>
+              <a:t>OpenCL</a:t>
+            </a:r>
+            <a:endParaRPr lang="de-DE" dirty="0"/>
           </a:p>
         </p:txBody>
       </p:sp>
@@ -7293,7 +7331,7 @@
           <p:cNvPr id="3" name="Inhaltsplatzhalter 2">
             <a:extLst>
               <a:ext uri="{FF2B5EF4-FFF2-40B4-BE49-F238E27FC236}">
-                <a16:creationId xmlns:a16="http://schemas.microsoft.com/office/drawing/2014/main" xmlns="" id="{054FEABA-6080-4B42-A48F-7A4DF3A2C20A}"/>
+                <a16:creationId xmlns="" xmlns:a16="http://schemas.microsoft.com/office/drawing/2014/main" id="{FC97EE4E-D42B-46E9-9E93-A6D4E2E15913}"/>
               </a:ext>
             </a:extLst>
           </p:cNvPr>
@@ -7311,54 +7349,87 @@
           <a:p>
             <a:r>
               <a:rPr lang="de-DE" dirty="0" smtClean="0"/>
-              <a:t>Lösung von Hr. Kumar nur für Simulation gedacht</a:t>
+              <a:t>2 Varianten entworfen</a:t>
             </a:r>
           </a:p>
           <a:p>
             <a:r>
               <a:rPr lang="de-DE" dirty="0" smtClean="0"/>
-              <a:t>Eigene Lösung entworfen</a:t>
+              <a:t>Beide sind auf der Grafikkarte lauffähig</a:t>
             </a:r>
           </a:p>
           <a:p>
             <a:r>
               <a:rPr lang="de-DE" dirty="0" smtClean="0"/>
-              <a:t>Sehr kleiner LBP Kern</a:t>
+              <a:t>Eine ist auf dem DE1-SoC lauffähig</a:t>
             </a:r>
           </a:p>
           <a:p>
             <a:r>
               <a:rPr lang="de-DE" dirty="0" smtClean="0"/>
-              <a:t>Großteil der Entwicklung: Infrastruktur</a:t>
+              <a:t>Hostprogramm zur Ausführung in C/C++</a:t>
             </a:r>
           </a:p>
           <a:p>
             <a:r>
               <a:rPr lang="de-DE" dirty="0" smtClean="0"/>
-              <a:t>Umsetzung nicht trivial</a:t>
-            </a:r>
-          </a:p>
-          <a:p>
+              <a:t>Kommunikation mit </a:t>
+            </a:r>
+            <a:r>
+              <a:rPr lang="de-DE" dirty="0" err="1" smtClean="0"/>
+              <a:t>Matlab</a:t>
+            </a:r>
             <a:r>
               <a:rPr lang="de-DE" dirty="0" smtClean="0"/>
-              <a:t>Nicht fehlerfrei simulierbar</a:t>
+              <a:t> via SSH/SCP</a:t>
             </a:r>
           </a:p>
           <a:p>
             <a:r>
               <a:rPr lang="de-DE" dirty="0" smtClean="0"/>
-              <a:t>Bedingt </a:t>
+              <a:t>Sehr langsam! (</a:t>
             </a:r>
             <a:r>
               <a:rPr lang="de-DE" dirty="0" err="1" smtClean="0"/>
-              <a:t>synthetisierbar</a:t>
-            </a:r>
-            <a:endParaRPr lang="de-DE" dirty="0" smtClean="0"/>
-          </a:p>
-          <a:p>
+              <a:t>ca</a:t>
+            </a:r>
             <a:r>
               <a:rPr lang="de-DE" dirty="0" smtClean="0"/>
-              <a:t>Für DE1-SoC mit Linux weitere Entwicklung nötig</a:t>
+              <a:t> 46s für ein 256x256 Bild, 1 Kernel)</a:t>
+            </a:r>
+          </a:p>
+          <a:p>
+            <a:r>
+              <a:rPr lang="de-DE" dirty="0" smtClean="0"/>
+              <a:t>Mehr Kernels != schneller (</a:t>
+            </a:r>
+            <a:r>
+              <a:rPr lang="de-DE" dirty="0" err="1" smtClean="0"/>
+              <a:t>ca</a:t>
+            </a:r>
+            <a:r>
+              <a:rPr lang="de-DE" dirty="0" smtClean="0"/>
+              <a:t> 56s für ein 256x256 Bild, 4 Kernel)</a:t>
+            </a:r>
+          </a:p>
+          <a:p>
+            <a:r>
+              <a:rPr lang="de-DE" dirty="0" smtClean="0"/>
+              <a:t>Probleme beim </a:t>
+            </a:r>
+            <a:r>
+              <a:rPr lang="de-DE" dirty="0" err="1" smtClean="0"/>
+              <a:t>konkurrenten</a:t>
+            </a:r>
+            <a:r>
+              <a:rPr lang="de-DE" dirty="0" smtClean="0"/>
+              <a:t> Speicherzugriff?</a:t>
+            </a:r>
+          </a:p>
+          <a:p>
+            <a:r>
+              <a:rPr lang="de-DE" dirty="0" smtClean="0"/>
+              <a:t>Selber Code, unterschiedliche Ergebnisse auf Grafikkarte bzw. FPGA</a:t>
             </a:r>
           </a:p>
         </p:txBody>
@@ -7368,7 +7439,7 @@
           <p:cNvPr id="4" name="Fußzeilenplatzhalter 3">
             <a:extLst>
               <a:ext uri="{FF2B5EF4-FFF2-40B4-BE49-F238E27FC236}">
-                <a16:creationId xmlns:a16="http://schemas.microsoft.com/office/drawing/2014/main" xmlns="" id="{3EE84E52-5BE9-4D99-8DB9-751624176F6F}"/>
+                <a16:creationId xmlns="" xmlns:a16="http://schemas.microsoft.com/office/drawing/2014/main" id="{F9986648-D8E9-42C3-848F-0F780D53C173}"/>
               </a:ext>
             </a:extLst>
           </p:cNvPr>
@@ -7394,7 +7465,7 @@
     </p:spTree>
     <p:extLst>
       <p:ext uri="{BB962C8B-B14F-4D97-AF65-F5344CB8AC3E}">
-        <p14:creationId xmlns:p14="http://schemas.microsoft.com/office/powerpoint/2010/main" val="3016190806"/>
+        <p14:creationId xmlns:p14="http://schemas.microsoft.com/office/powerpoint/2010/main" val="1622247769"/>
       </p:ext>
     </p:extLst>
   </p:cSld>
@@ -7426,7 +7497,7 @@
           <p:cNvPr id="2" name="Titel 1">
             <a:extLst>
               <a:ext uri="{FF2B5EF4-FFF2-40B4-BE49-F238E27FC236}">
-                <a16:creationId xmlns:a16="http://schemas.microsoft.com/office/drawing/2014/main" xmlns="" id="{0580E4C2-EB66-46DC-BA2A-B665A84F0EF3}"/>
+                <a16:creationId xmlns="" xmlns:a16="http://schemas.microsoft.com/office/drawing/2014/main" id="{8B6B458A-A4CA-433F-AAAD-8FC04CABFF33}"/>
               </a:ext>
             </a:extLst>
           </p:cNvPr>
@@ -7444,7 +7515,7 @@
           <a:p>
             <a:r>
               <a:rPr lang="de-DE" dirty="0"/>
-              <a:t>Fazit</a:t>
+              <a:t>VHDL</a:t>
             </a:r>
           </a:p>
         </p:txBody>
@@ -7454,7 +7525,7 @@
           <p:cNvPr id="3" name="Inhaltsplatzhalter 2">
             <a:extLst>
               <a:ext uri="{FF2B5EF4-FFF2-40B4-BE49-F238E27FC236}">
-                <a16:creationId xmlns:a16="http://schemas.microsoft.com/office/drawing/2014/main" xmlns="" id="{E303F5D1-DC3B-469E-9EAF-2342748534C8}"/>
+                <a16:creationId xmlns="" xmlns:a16="http://schemas.microsoft.com/office/drawing/2014/main" id="{054FEABA-6080-4B42-A48F-7A4DF3A2C20A}"/>
               </a:ext>
             </a:extLst>
           </p:cNvPr>
@@ -7472,96 +7543,55 @@
           <a:p>
             <a:r>
               <a:rPr lang="de-DE" dirty="0" smtClean="0"/>
-              <a:t>Mit </a:t>
+              <a:t>Lösung von Hr. Kumar nur für Simulation gedacht</a:t>
+            </a:r>
+          </a:p>
+          <a:p>
+            <a:r>
+              <a:rPr lang="de-DE" dirty="0" smtClean="0"/>
+              <a:t>Eigene Lösung entworfen</a:t>
+            </a:r>
+          </a:p>
+          <a:p>
+            <a:r>
+              <a:rPr lang="de-DE" dirty="0" smtClean="0"/>
+              <a:t>Sehr kleiner LBP Kern</a:t>
+            </a:r>
+          </a:p>
+          <a:p>
+            <a:r>
+              <a:rPr lang="de-DE" dirty="0" smtClean="0"/>
+              <a:t>Großteil der Entwicklung: Infrastruktur</a:t>
+            </a:r>
+          </a:p>
+          <a:p>
+            <a:r>
+              <a:rPr lang="de-DE" dirty="0" smtClean="0"/>
+              <a:t>Umsetzung nicht trivial</a:t>
+            </a:r>
+          </a:p>
+          <a:p>
+            <a:r>
+              <a:rPr lang="de-DE" dirty="0" smtClean="0"/>
+              <a:t>Nicht fehlerfrei simulierbar</a:t>
+            </a:r>
+          </a:p>
+          <a:p>
+            <a:r>
+              <a:rPr lang="de-DE" dirty="0" smtClean="0"/>
+              <a:t>Bedingt </a:t>
             </a:r>
             <a:r>
               <a:rPr lang="de-DE" dirty="0" err="1" smtClean="0"/>
-              <a:t>OpenCL</a:t>
-            </a:r>
+              <a:t>synthetisierbar</a:t>
+            </a:r>
+            <a:endParaRPr lang="de-DE" dirty="0" smtClean="0"/>
+          </a:p>
+          <a:p>
             <a:r>
               <a:rPr lang="de-DE" dirty="0" smtClean="0"/>
-              <a:t> ist ein Ergebnis deutlich schneller zu erzielen</a:t>
-            </a:r>
-          </a:p>
-          <a:p>
-            <a:r>
-              <a:rPr lang="de-DE" dirty="0" err="1" smtClean="0"/>
-              <a:t>OpenCL</a:t>
-            </a:r>
-            <a:r>
-              <a:rPr lang="de-DE" dirty="0" smtClean="0"/>
-              <a:t> != </a:t>
-            </a:r>
-            <a:r>
-              <a:rPr lang="de-DE" dirty="0" err="1" smtClean="0"/>
-              <a:t>OpenCL</a:t>
-            </a:r>
-            <a:r>
-              <a:rPr lang="de-DE" dirty="0" smtClean="0"/>
-              <a:t>: Viele Details zu beachten</a:t>
-            </a:r>
-          </a:p>
-          <a:p>
-            <a:r>
-              <a:rPr lang="de-DE" dirty="0" err="1" smtClean="0"/>
-              <a:t>OpenCL</a:t>
-            </a:r>
-            <a:r>
-              <a:rPr lang="de-DE" dirty="0" smtClean="0"/>
-              <a:t> Lösung ist auf DE1-SoC sehr </a:t>
-            </a:r>
-            <a:r>
-              <a:rPr lang="de-DE" dirty="0" smtClean="0"/>
-              <a:t>langsam</a:t>
-            </a:r>
-          </a:p>
-          <a:p>
-            <a:pPr lvl="0"/>
-            <a:r>
-              <a:rPr lang="de-DE" dirty="0"/>
-              <a:t>Die Ergebnisse der </a:t>
-            </a:r>
-            <a:r>
-              <a:rPr lang="de-DE" dirty="0" err="1" smtClean="0"/>
-              <a:t>OpenCL</a:t>
-            </a:r>
-            <a:r>
-              <a:rPr lang="de-DE" dirty="0" smtClean="0"/>
-              <a:t>-Lösung (GPU </a:t>
-            </a:r>
-            <a:r>
-              <a:rPr lang="de-DE" dirty="0" err="1" smtClean="0"/>
-              <a:t>vs</a:t>
-            </a:r>
-            <a:r>
-              <a:rPr lang="de-DE" dirty="0" smtClean="0"/>
-              <a:t> FPGA) </a:t>
-            </a:r>
-            <a:r>
-              <a:rPr lang="de-DE" smtClean="0"/>
-              <a:t>unterscheiden sich</a:t>
-            </a:r>
-            <a:endParaRPr lang="de-DE" dirty="0" smtClean="0"/>
-          </a:p>
-          <a:p>
-            <a:r>
-              <a:rPr lang="de-DE" dirty="0" smtClean="0"/>
-              <a:t>VHDL Lösung nicht lauffähig</a:t>
-            </a:r>
-          </a:p>
-          <a:p>
-            <a:r>
-              <a:rPr lang="de-DE" dirty="0" smtClean="0"/>
-              <a:t>Sehr viel höherer Entwicklungsaufwand für die VHDL </a:t>
-            </a:r>
-            <a:r>
-              <a:rPr lang="de-DE" dirty="0" smtClean="0"/>
-              <a:t>Lösung</a:t>
-            </a:r>
-            <a:endParaRPr lang="de-DE" dirty="0" smtClean="0"/>
-          </a:p>
-          <a:p>
-            <a:endParaRPr lang="de-DE" dirty="0"/>
+              <a:t>Für DE1-SoC mit Linux weitere Entwicklung nötig</a:t>
+            </a:r>
           </a:p>
         </p:txBody>
       </p:sp>
@@ -7570,7 +7600,7 @@
           <p:cNvPr id="4" name="Fußzeilenplatzhalter 3">
             <a:extLst>
               <a:ext uri="{FF2B5EF4-FFF2-40B4-BE49-F238E27FC236}">
-                <a16:creationId xmlns:a16="http://schemas.microsoft.com/office/drawing/2014/main" xmlns="" id="{66F2FD68-A385-4A5A-82BB-108B4682803C}"/>
+                <a16:creationId xmlns="" xmlns:a16="http://schemas.microsoft.com/office/drawing/2014/main" id="{3EE84E52-5BE9-4D99-8DB9-751624176F6F}"/>
               </a:ext>
             </a:extLst>
           </p:cNvPr>
@@ -7596,7 +7626,7 @@
     </p:spTree>
     <p:extLst>
       <p:ext uri="{BB962C8B-B14F-4D97-AF65-F5344CB8AC3E}">
-        <p14:creationId xmlns:p14="http://schemas.microsoft.com/office/powerpoint/2010/main" val="472536550"/>
+        <p14:creationId xmlns:p14="http://schemas.microsoft.com/office/powerpoint/2010/main" val="3016190806"/>
       </p:ext>
     </p:extLst>
   </p:cSld>
@@ -7628,7 +7658,7 @@
           <p:cNvPr id="2" name="Titel 1">
             <a:extLst>
               <a:ext uri="{FF2B5EF4-FFF2-40B4-BE49-F238E27FC236}">
-                <a16:creationId xmlns:a16="http://schemas.microsoft.com/office/drawing/2014/main" xmlns="" id="{0529C191-2FA4-420C-8CDE-625C270054F9}"/>
+                <a16:creationId xmlns="" xmlns:a16="http://schemas.microsoft.com/office/drawing/2014/main" id="{0580E4C2-EB66-46DC-BA2A-B665A84F0EF3}"/>
               </a:ext>
             </a:extLst>
           </p:cNvPr>
@@ -7646,17 +7676,17 @@
           <a:p>
             <a:r>
               <a:rPr lang="de-DE" dirty="0"/>
-              <a:t>Wechsel zur Vorführung</a:t>
-            </a:r>
-          </a:p>
-        </p:txBody>
-      </p:sp>
-      <p:sp>
-        <p:nvSpPr>
-          <p:cNvPr id="3" name="Textplatzhalter 2">
+              <a:t>Fazit</a:t>
+            </a:r>
+          </a:p>
+        </p:txBody>
+      </p:sp>
+      <p:sp>
+        <p:nvSpPr>
+          <p:cNvPr id="3" name="Inhaltsplatzhalter 2">
             <a:extLst>
               <a:ext uri="{FF2B5EF4-FFF2-40B4-BE49-F238E27FC236}">
-                <a16:creationId xmlns:a16="http://schemas.microsoft.com/office/drawing/2014/main" xmlns="" id="{74D8B0BB-964D-4766-8243-C38AE0AFC304}"/>
+                <a16:creationId xmlns="" xmlns:a16="http://schemas.microsoft.com/office/drawing/2014/main" id="{E303F5D1-DC3B-469E-9EAF-2342748534C8}"/>
               </a:ext>
             </a:extLst>
           </p:cNvPr>
@@ -7664,7 +7694,7 @@
             <a:spLocks noGrp="1"/>
           </p:cNvSpPr>
           <p:nvPr>
-            <p:ph type="body" idx="1"/>
+            <p:ph idx="1"/>
           </p:nvPr>
         </p:nvSpPr>
         <p:spPr/>
@@ -7672,7 +7702,89 @@
           <a:bodyPr/>
           <a:lstStyle/>
           <a:p>
-            <a:endParaRPr lang="de-DE"/>
+            <a:r>
+              <a:rPr lang="de-DE" dirty="0" smtClean="0"/>
+              <a:t>Mit </a:t>
+            </a:r>
+            <a:r>
+              <a:rPr lang="de-DE" dirty="0" err="1" smtClean="0"/>
+              <a:t>OpenCL</a:t>
+            </a:r>
+            <a:r>
+              <a:rPr lang="de-DE" dirty="0" smtClean="0"/>
+              <a:t> ist ein Ergebnis deutlich schneller zu erzielen</a:t>
+            </a:r>
+          </a:p>
+          <a:p>
+            <a:r>
+              <a:rPr lang="de-DE" dirty="0" err="1" smtClean="0"/>
+              <a:t>OpenCL</a:t>
+            </a:r>
+            <a:r>
+              <a:rPr lang="de-DE" dirty="0" smtClean="0"/>
+              <a:t> != </a:t>
+            </a:r>
+            <a:r>
+              <a:rPr lang="de-DE" dirty="0" err="1" smtClean="0"/>
+              <a:t>OpenCL</a:t>
+            </a:r>
+            <a:r>
+              <a:rPr lang="de-DE" dirty="0" smtClean="0"/>
+              <a:t>: Viele Details zu beachten</a:t>
+            </a:r>
+          </a:p>
+          <a:p>
+            <a:r>
+              <a:rPr lang="de-DE" dirty="0" err="1" smtClean="0"/>
+              <a:t>OpenCL</a:t>
+            </a:r>
+            <a:r>
+              <a:rPr lang="de-DE" dirty="0" smtClean="0"/>
+              <a:t> Lösung ist auf DE1-SoC sehr langsam</a:t>
+            </a:r>
+          </a:p>
+          <a:p>
+            <a:pPr lvl="0"/>
+            <a:r>
+              <a:rPr lang="de-DE" dirty="0"/>
+              <a:t>Die Ergebnisse der </a:t>
+            </a:r>
+            <a:r>
+              <a:rPr lang="de-DE" dirty="0" err="1" smtClean="0"/>
+              <a:t>OpenCL</a:t>
+            </a:r>
+            <a:r>
+              <a:rPr lang="de-DE" dirty="0" smtClean="0"/>
+              <a:t>-Lösung (GPU </a:t>
+            </a:r>
+            <a:r>
+              <a:rPr lang="de-DE" dirty="0" err="1" smtClean="0"/>
+              <a:t>vs</a:t>
+            </a:r>
+            <a:r>
+              <a:rPr lang="de-DE" dirty="0" smtClean="0"/>
+              <a:t> FPGA) </a:t>
+            </a:r>
+            <a:r>
+              <a:rPr lang="de-DE" smtClean="0"/>
+              <a:t>unterscheiden sich</a:t>
+            </a:r>
+            <a:endParaRPr lang="de-DE" dirty="0" smtClean="0"/>
+          </a:p>
+          <a:p>
+            <a:r>
+              <a:rPr lang="de-DE" dirty="0" smtClean="0"/>
+              <a:t>VHDL Lösung nicht lauffähig</a:t>
+            </a:r>
+          </a:p>
+          <a:p>
+            <a:r>
+              <a:rPr lang="de-DE" dirty="0" smtClean="0"/>
+              <a:t>Sehr viel höherer Entwicklungsaufwand für die VHDL Lösung</a:t>
+            </a:r>
+          </a:p>
+          <a:p>
+            <a:endParaRPr lang="de-DE" dirty="0"/>
           </a:p>
         </p:txBody>
       </p:sp>
@@ -7681,7 +7793,7 @@
           <p:cNvPr id="4" name="Fußzeilenplatzhalter 3">
             <a:extLst>
               <a:ext uri="{FF2B5EF4-FFF2-40B4-BE49-F238E27FC236}">
-                <a16:creationId xmlns:a16="http://schemas.microsoft.com/office/drawing/2014/main" xmlns="" id="{AE7C686D-C715-46E7-B50C-5436AF564484}"/>
+                <a16:creationId xmlns="" xmlns:a16="http://schemas.microsoft.com/office/drawing/2014/main" id="{66F2FD68-A385-4A5A-82BB-108B4682803C}"/>
               </a:ext>
             </a:extLst>
           </p:cNvPr>
@@ -7707,7 +7819,7 @@
     </p:spTree>
     <p:extLst>
       <p:ext uri="{BB962C8B-B14F-4D97-AF65-F5344CB8AC3E}">
-        <p14:creationId xmlns:p14="http://schemas.microsoft.com/office/powerpoint/2010/main" val="815276268"/>
+        <p14:creationId xmlns:p14="http://schemas.microsoft.com/office/powerpoint/2010/main" val="472536550"/>
       </p:ext>
     </p:extLst>
   </p:cSld>

</xml_diff>